<commit_message>
Updated DeveloperGuide from 3.1 Architecture to 3.5 Storage component
</commit_message>
<xml_diff>
--- a/docs/diagrams/HighLevelSequenceDiagrams.pptx
+++ b/docs/diagrams/HighLevelSequenceDiagrams.pptx
@@ -8,7 +8,7 @@
     <p:notesMasterId r:id="rId3"/>
   </p:notesMasterIdLst>
   <p:sldIdLst>
-    <p:sldId id="266" r:id="rId2"/>
+    <p:sldId id="268" r:id="rId2"/>
   </p:sldIdLst>
   <p:sldSz cx="9144000" cy="6858000" type="screen4x3"/>
   <p:notesSz cx="6858000" cy="9144000"/>
@@ -107,6 +107,22 @@
       </a:defRPr>
     </a:lvl9pPr>
   </p:defaultTextStyle>
+  <p:extLst>
+    <p:ext uri="{EFAFB233-063F-42B5-8137-9DF3F51BA10A}">
+      <p15:sldGuideLst xmlns:p15="http://schemas.microsoft.com/office/powerpoint/2012/main">
+        <p15:guide id="1" orient="horz" pos="1488">
+          <p15:clr>
+            <a:srgbClr val="A4A3A4"/>
+          </p15:clr>
+        </p15:guide>
+        <p15:guide id="2" pos="2880">
+          <p15:clr>
+            <a:srgbClr val="A4A3A4"/>
+          </p15:clr>
+        </p15:guide>
+      </p15:sldGuideLst>
+    </p:ext>
+  </p:extLst>
 </p:presentation>
 </file>
 
@@ -192,7 +208,7 @@
           <a:p>
             <a:fld id="{F5CC4B3F-88C1-4FFA-B1B6-F41C21DC6924}" type="datetimeFigureOut">
               <a:rPr lang="en-US" smtClean="0"/>
-              <a:t>10/16/2016</a:t>
+              <a:t>10/30/2018</a:t>
             </a:fld>
             <a:endParaRPr lang="en-US"/>
           </a:p>
@@ -256,38 +272,37 @@
           <a:p>
             <a:pPr lvl="0"/>
             <a:r>
-              <a:rPr lang="en-US" smtClean="0"/>
+              <a:rPr lang="en-US"/>
               <a:t>Click to edit Master text styles</a:t>
             </a:r>
           </a:p>
           <a:p>
             <a:pPr lvl="1"/>
             <a:r>
-              <a:rPr lang="en-US" smtClean="0"/>
+              <a:rPr lang="en-US"/>
               <a:t>Second level</a:t>
             </a:r>
           </a:p>
           <a:p>
             <a:pPr lvl="2"/>
             <a:r>
-              <a:rPr lang="en-US" smtClean="0"/>
+              <a:rPr lang="en-US"/>
               <a:t>Third level</a:t>
             </a:r>
           </a:p>
           <a:p>
             <a:pPr lvl="3"/>
             <a:r>
-              <a:rPr lang="en-US" smtClean="0"/>
+              <a:rPr lang="en-US"/>
               <a:t>Fourth level</a:t>
             </a:r>
           </a:p>
           <a:p>
             <a:pPr lvl="4"/>
             <a:r>
-              <a:rPr lang="en-US" smtClean="0"/>
+              <a:rPr lang="en-US"/>
               <a:t>Fifth level</a:t>
             </a:r>
-            <a:endParaRPr lang="en-US"/>
           </a:p>
         </p:txBody>
       </p:sp>
@@ -498,10 +513,9 @@
           <a:lstStyle/>
           <a:p>
             <a:r>
-              <a:rPr lang="en-US" smtClean="0"/>
+              <a:rPr lang="en-US"/>
               <a:t>Click to edit Master title style</a:t>
             </a:r>
-            <a:endParaRPr lang="en-US"/>
           </a:p>
         </p:txBody>
       </p:sp>
@@ -617,10 +631,9 @@
           </a:lstStyle>
           <a:p>
             <a:r>
-              <a:rPr lang="en-US" smtClean="0"/>
+              <a:rPr lang="en-US"/>
               <a:t>Click to edit Master subtitle style</a:t>
             </a:r>
-            <a:endParaRPr lang="en-US"/>
           </a:p>
         </p:txBody>
       </p:sp>
@@ -641,7 +654,7 @@
           <a:p>
             <a:fld id="{78C97017-6FC3-485B-9764-EAC9E56C1D49}" type="datetimeFigureOut">
               <a:rPr lang="en-US" smtClean="0"/>
-              <a:t>10/16/2016</a:t>
+              <a:t>10/30/2018</a:t>
             </a:fld>
             <a:endParaRPr lang="en-US"/>
           </a:p>
@@ -735,10 +748,9 @@
           <a:lstStyle/>
           <a:p>
             <a:r>
-              <a:rPr lang="en-US" smtClean="0"/>
+              <a:rPr lang="en-US"/>
               <a:t>Click to edit Master title style</a:t>
             </a:r>
-            <a:endParaRPr lang="en-US"/>
           </a:p>
         </p:txBody>
       </p:sp>
@@ -759,38 +771,37 @@
           <a:p>
             <a:pPr lvl="0"/>
             <a:r>
-              <a:rPr lang="en-US" smtClean="0"/>
+              <a:rPr lang="en-US"/>
               <a:t>Click to edit Master text styles</a:t>
             </a:r>
           </a:p>
           <a:p>
             <a:pPr lvl="1"/>
             <a:r>
-              <a:rPr lang="en-US" smtClean="0"/>
+              <a:rPr lang="en-US"/>
               <a:t>Second level</a:t>
             </a:r>
           </a:p>
           <a:p>
             <a:pPr lvl="2"/>
             <a:r>
-              <a:rPr lang="en-US" smtClean="0"/>
+              <a:rPr lang="en-US"/>
               <a:t>Third level</a:t>
             </a:r>
           </a:p>
           <a:p>
             <a:pPr lvl="3"/>
             <a:r>
-              <a:rPr lang="en-US" smtClean="0"/>
+              <a:rPr lang="en-US"/>
               <a:t>Fourth level</a:t>
             </a:r>
           </a:p>
           <a:p>
             <a:pPr lvl="4"/>
             <a:r>
-              <a:rPr lang="en-US" smtClean="0"/>
+              <a:rPr lang="en-US"/>
               <a:t>Fifth level</a:t>
             </a:r>
-            <a:endParaRPr lang="en-US"/>
           </a:p>
         </p:txBody>
       </p:sp>
@@ -811,7 +822,7 @@
           <a:p>
             <a:fld id="{78C97017-6FC3-485B-9764-EAC9E56C1D49}" type="datetimeFigureOut">
               <a:rPr lang="en-US" smtClean="0"/>
-              <a:t>10/16/2016</a:t>
+              <a:t>10/30/2018</a:t>
             </a:fld>
             <a:endParaRPr lang="en-US"/>
           </a:p>
@@ -910,10 +921,9 @@
           <a:lstStyle/>
           <a:p>
             <a:r>
-              <a:rPr lang="en-US" smtClean="0"/>
+              <a:rPr lang="en-US"/>
               <a:t>Click to edit Master title style</a:t>
             </a:r>
-            <a:endParaRPr lang="en-US"/>
           </a:p>
         </p:txBody>
       </p:sp>
@@ -939,38 +949,37 @@
           <a:p>
             <a:pPr lvl="0"/>
             <a:r>
-              <a:rPr lang="en-US" smtClean="0"/>
+              <a:rPr lang="en-US"/>
               <a:t>Click to edit Master text styles</a:t>
             </a:r>
           </a:p>
           <a:p>
             <a:pPr lvl="1"/>
             <a:r>
-              <a:rPr lang="en-US" smtClean="0"/>
+              <a:rPr lang="en-US"/>
               <a:t>Second level</a:t>
             </a:r>
           </a:p>
           <a:p>
             <a:pPr lvl="2"/>
             <a:r>
-              <a:rPr lang="en-US" smtClean="0"/>
+              <a:rPr lang="en-US"/>
               <a:t>Third level</a:t>
             </a:r>
           </a:p>
           <a:p>
             <a:pPr lvl="3"/>
             <a:r>
-              <a:rPr lang="en-US" smtClean="0"/>
+              <a:rPr lang="en-US"/>
               <a:t>Fourth level</a:t>
             </a:r>
           </a:p>
           <a:p>
             <a:pPr lvl="4"/>
             <a:r>
-              <a:rPr lang="en-US" smtClean="0"/>
+              <a:rPr lang="en-US"/>
               <a:t>Fifth level</a:t>
             </a:r>
-            <a:endParaRPr lang="en-US"/>
           </a:p>
         </p:txBody>
       </p:sp>
@@ -991,7 +1000,7 @@
           <a:p>
             <a:fld id="{78C97017-6FC3-485B-9764-EAC9E56C1D49}" type="datetimeFigureOut">
               <a:rPr lang="en-US" smtClean="0"/>
-              <a:t>10/16/2016</a:t>
+              <a:t>10/30/2018</a:t>
             </a:fld>
             <a:endParaRPr lang="en-US"/>
           </a:p>
@@ -1085,10 +1094,9 @@
           <a:lstStyle/>
           <a:p>
             <a:r>
-              <a:rPr lang="en-US" smtClean="0"/>
+              <a:rPr lang="en-US"/>
               <a:t>Click to edit Master title style</a:t>
             </a:r>
-            <a:endParaRPr lang="en-US"/>
           </a:p>
         </p:txBody>
       </p:sp>
@@ -1109,38 +1117,37 @@
           <a:p>
             <a:pPr lvl="0"/>
             <a:r>
-              <a:rPr lang="en-US" smtClean="0"/>
+              <a:rPr lang="en-US"/>
               <a:t>Click to edit Master text styles</a:t>
             </a:r>
           </a:p>
           <a:p>
             <a:pPr lvl="1"/>
             <a:r>
-              <a:rPr lang="en-US" smtClean="0"/>
+              <a:rPr lang="en-US"/>
               <a:t>Second level</a:t>
             </a:r>
           </a:p>
           <a:p>
             <a:pPr lvl="2"/>
             <a:r>
-              <a:rPr lang="en-US" smtClean="0"/>
+              <a:rPr lang="en-US"/>
               <a:t>Third level</a:t>
             </a:r>
           </a:p>
           <a:p>
             <a:pPr lvl="3"/>
             <a:r>
-              <a:rPr lang="en-US" smtClean="0"/>
+              <a:rPr lang="en-US"/>
               <a:t>Fourth level</a:t>
             </a:r>
           </a:p>
           <a:p>
             <a:pPr lvl="4"/>
             <a:r>
-              <a:rPr lang="en-US" smtClean="0"/>
+              <a:rPr lang="en-US"/>
               <a:t>Fifth level</a:t>
             </a:r>
-            <a:endParaRPr lang="en-US"/>
           </a:p>
         </p:txBody>
       </p:sp>
@@ -1161,7 +1168,7 @@
           <a:p>
             <a:fld id="{78C97017-6FC3-485B-9764-EAC9E56C1D49}" type="datetimeFigureOut">
               <a:rPr lang="en-US" smtClean="0"/>
-              <a:t>10/16/2016</a:t>
+              <a:t>10/30/2018</a:t>
             </a:fld>
             <a:endParaRPr lang="en-US"/>
           </a:p>
@@ -1264,10 +1271,9 @@
           </a:lstStyle>
           <a:p>
             <a:r>
-              <a:rPr lang="en-US" smtClean="0"/>
+              <a:rPr lang="en-US"/>
               <a:t>Click to edit Master title style</a:t>
             </a:r>
-            <a:endParaRPr lang="en-US"/>
           </a:p>
         </p:txBody>
       </p:sp>
@@ -1384,7 +1390,7 @@
           <a:p>
             <a:pPr lvl="0"/>
             <a:r>
-              <a:rPr lang="en-US" smtClean="0"/>
+              <a:rPr lang="en-US"/>
               <a:t>Click to edit Master text styles</a:t>
             </a:r>
           </a:p>
@@ -1407,7 +1413,7 @@
           <a:p>
             <a:fld id="{78C97017-6FC3-485B-9764-EAC9E56C1D49}" type="datetimeFigureOut">
               <a:rPr lang="en-US" smtClean="0"/>
-              <a:t>10/16/2016</a:t>
+              <a:t>10/30/2018</a:t>
             </a:fld>
             <a:endParaRPr lang="en-US"/>
           </a:p>
@@ -1501,10 +1507,9 @@
           <a:lstStyle/>
           <a:p>
             <a:r>
-              <a:rPr lang="en-US" smtClean="0"/>
+              <a:rPr lang="en-US"/>
               <a:t>Click to edit Master title style</a:t>
             </a:r>
-            <a:endParaRPr lang="en-US"/>
           </a:p>
         </p:txBody>
       </p:sp>
@@ -1558,38 +1563,37 @@
           <a:p>
             <a:pPr lvl="0"/>
             <a:r>
-              <a:rPr lang="en-US" smtClean="0"/>
+              <a:rPr lang="en-US"/>
               <a:t>Click to edit Master text styles</a:t>
             </a:r>
           </a:p>
           <a:p>
             <a:pPr lvl="1"/>
             <a:r>
-              <a:rPr lang="en-US" smtClean="0"/>
+              <a:rPr lang="en-US"/>
               <a:t>Second level</a:t>
             </a:r>
           </a:p>
           <a:p>
             <a:pPr lvl="2"/>
             <a:r>
-              <a:rPr lang="en-US" smtClean="0"/>
+              <a:rPr lang="en-US"/>
               <a:t>Third level</a:t>
             </a:r>
           </a:p>
           <a:p>
             <a:pPr lvl="3"/>
             <a:r>
-              <a:rPr lang="en-US" smtClean="0"/>
+              <a:rPr lang="en-US"/>
               <a:t>Fourth level</a:t>
             </a:r>
           </a:p>
           <a:p>
             <a:pPr lvl="4"/>
             <a:r>
-              <a:rPr lang="en-US" smtClean="0"/>
+              <a:rPr lang="en-US"/>
               <a:t>Fifth level</a:t>
             </a:r>
-            <a:endParaRPr lang="en-US"/>
           </a:p>
         </p:txBody>
       </p:sp>
@@ -1643,38 +1647,37 @@
           <a:p>
             <a:pPr lvl="0"/>
             <a:r>
-              <a:rPr lang="en-US" smtClean="0"/>
+              <a:rPr lang="en-US"/>
               <a:t>Click to edit Master text styles</a:t>
             </a:r>
           </a:p>
           <a:p>
             <a:pPr lvl="1"/>
             <a:r>
-              <a:rPr lang="en-US" smtClean="0"/>
+              <a:rPr lang="en-US"/>
               <a:t>Second level</a:t>
             </a:r>
           </a:p>
           <a:p>
             <a:pPr lvl="2"/>
             <a:r>
-              <a:rPr lang="en-US" smtClean="0"/>
+              <a:rPr lang="en-US"/>
               <a:t>Third level</a:t>
             </a:r>
           </a:p>
           <a:p>
             <a:pPr lvl="3"/>
             <a:r>
-              <a:rPr lang="en-US" smtClean="0"/>
+              <a:rPr lang="en-US"/>
               <a:t>Fourth level</a:t>
             </a:r>
           </a:p>
           <a:p>
             <a:pPr lvl="4"/>
             <a:r>
-              <a:rPr lang="en-US" smtClean="0"/>
+              <a:rPr lang="en-US"/>
               <a:t>Fifth level</a:t>
             </a:r>
-            <a:endParaRPr lang="en-US"/>
           </a:p>
         </p:txBody>
       </p:sp>
@@ -1695,7 +1698,7 @@
           <a:p>
             <a:fld id="{78C97017-6FC3-485B-9764-EAC9E56C1D49}" type="datetimeFigureOut">
               <a:rPr lang="en-US" smtClean="0"/>
-              <a:t>10/16/2016</a:t>
+              <a:t>10/30/2018</a:t>
             </a:fld>
             <a:endParaRPr lang="en-US"/>
           </a:p>
@@ -1793,10 +1796,9 @@
           </a:lstStyle>
           <a:p>
             <a:r>
-              <a:rPr lang="en-US" smtClean="0"/>
+              <a:rPr lang="en-US"/>
               <a:t>Click to edit Master title style</a:t>
             </a:r>
-            <a:endParaRPr lang="en-US"/>
           </a:p>
         </p:txBody>
       </p:sp>
@@ -1859,7 +1861,7 @@
           <a:p>
             <a:pPr lvl="0"/>
             <a:r>
-              <a:rPr lang="en-US" smtClean="0"/>
+              <a:rPr lang="en-US"/>
               <a:t>Click to edit Master text styles</a:t>
             </a:r>
           </a:p>
@@ -1915,38 +1917,37 @@
           <a:p>
             <a:pPr lvl="0"/>
             <a:r>
-              <a:rPr lang="en-US" smtClean="0"/>
+              <a:rPr lang="en-US"/>
               <a:t>Click to edit Master text styles</a:t>
             </a:r>
           </a:p>
           <a:p>
             <a:pPr lvl="1"/>
             <a:r>
-              <a:rPr lang="en-US" smtClean="0"/>
+              <a:rPr lang="en-US"/>
               <a:t>Second level</a:t>
             </a:r>
           </a:p>
           <a:p>
             <a:pPr lvl="2"/>
             <a:r>
-              <a:rPr lang="en-US" smtClean="0"/>
+              <a:rPr lang="en-US"/>
               <a:t>Third level</a:t>
             </a:r>
           </a:p>
           <a:p>
             <a:pPr lvl="3"/>
             <a:r>
-              <a:rPr lang="en-US" smtClean="0"/>
+              <a:rPr lang="en-US"/>
               <a:t>Fourth level</a:t>
             </a:r>
           </a:p>
           <a:p>
             <a:pPr lvl="4"/>
             <a:r>
-              <a:rPr lang="en-US" smtClean="0"/>
+              <a:rPr lang="en-US"/>
               <a:t>Fifth level</a:t>
             </a:r>
-            <a:endParaRPr lang="en-US"/>
           </a:p>
         </p:txBody>
       </p:sp>
@@ -2009,7 +2010,7 @@
           <a:p>
             <a:pPr lvl="0"/>
             <a:r>
-              <a:rPr lang="en-US" smtClean="0"/>
+              <a:rPr lang="en-US"/>
               <a:t>Click to edit Master text styles</a:t>
             </a:r>
           </a:p>
@@ -2065,38 +2066,37 @@
           <a:p>
             <a:pPr lvl="0"/>
             <a:r>
-              <a:rPr lang="en-US" smtClean="0"/>
+              <a:rPr lang="en-US"/>
               <a:t>Click to edit Master text styles</a:t>
             </a:r>
           </a:p>
           <a:p>
             <a:pPr lvl="1"/>
             <a:r>
-              <a:rPr lang="en-US" smtClean="0"/>
+              <a:rPr lang="en-US"/>
               <a:t>Second level</a:t>
             </a:r>
           </a:p>
           <a:p>
             <a:pPr lvl="2"/>
             <a:r>
-              <a:rPr lang="en-US" smtClean="0"/>
+              <a:rPr lang="en-US"/>
               <a:t>Third level</a:t>
             </a:r>
           </a:p>
           <a:p>
             <a:pPr lvl="3"/>
             <a:r>
-              <a:rPr lang="en-US" smtClean="0"/>
+              <a:rPr lang="en-US"/>
               <a:t>Fourth level</a:t>
             </a:r>
           </a:p>
           <a:p>
             <a:pPr lvl="4"/>
             <a:r>
-              <a:rPr lang="en-US" smtClean="0"/>
+              <a:rPr lang="en-US"/>
               <a:t>Fifth level</a:t>
             </a:r>
-            <a:endParaRPr lang="en-US"/>
           </a:p>
         </p:txBody>
       </p:sp>
@@ -2117,7 +2117,7 @@
           <a:p>
             <a:fld id="{78C97017-6FC3-485B-9764-EAC9E56C1D49}" type="datetimeFigureOut">
               <a:rPr lang="en-US" smtClean="0"/>
-              <a:t>10/16/2016</a:t>
+              <a:t>10/30/2018</a:t>
             </a:fld>
             <a:endParaRPr lang="en-US"/>
           </a:p>
@@ -2211,10 +2211,9 @@
           <a:lstStyle/>
           <a:p>
             <a:r>
-              <a:rPr lang="en-US" smtClean="0"/>
+              <a:rPr lang="en-US"/>
               <a:t>Click to edit Master title style</a:t>
             </a:r>
-            <a:endParaRPr lang="en-US"/>
           </a:p>
         </p:txBody>
       </p:sp>
@@ -2235,7 +2234,7 @@
           <a:p>
             <a:fld id="{78C97017-6FC3-485B-9764-EAC9E56C1D49}" type="datetimeFigureOut">
               <a:rPr lang="en-US" smtClean="0"/>
-              <a:t>10/16/2016</a:t>
+              <a:t>10/30/2018</a:t>
             </a:fld>
             <a:endParaRPr lang="en-US"/>
           </a:p>
@@ -2330,7 +2329,7 @@
           <a:p>
             <a:fld id="{78C97017-6FC3-485B-9764-EAC9E56C1D49}" type="datetimeFigureOut">
               <a:rPr lang="en-US" smtClean="0"/>
-              <a:t>10/16/2016</a:t>
+              <a:t>10/30/2018</a:t>
             </a:fld>
             <a:endParaRPr lang="en-US"/>
           </a:p>
@@ -2433,10 +2432,9 @@
           </a:lstStyle>
           <a:p>
             <a:r>
-              <a:rPr lang="en-US" smtClean="0"/>
+              <a:rPr lang="en-US"/>
               <a:t>Click to edit Master title style</a:t>
             </a:r>
-            <a:endParaRPr lang="en-US"/>
           </a:p>
         </p:txBody>
       </p:sp>
@@ -2490,38 +2488,37 @@
           <a:p>
             <a:pPr lvl="0"/>
             <a:r>
-              <a:rPr lang="en-US" smtClean="0"/>
+              <a:rPr lang="en-US"/>
               <a:t>Click to edit Master text styles</a:t>
             </a:r>
           </a:p>
           <a:p>
             <a:pPr lvl="1"/>
             <a:r>
-              <a:rPr lang="en-US" smtClean="0"/>
+              <a:rPr lang="en-US"/>
               <a:t>Second level</a:t>
             </a:r>
           </a:p>
           <a:p>
             <a:pPr lvl="2"/>
             <a:r>
-              <a:rPr lang="en-US" smtClean="0"/>
+              <a:rPr lang="en-US"/>
               <a:t>Third level</a:t>
             </a:r>
           </a:p>
           <a:p>
             <a:pPr lvl="3"/>
             <a:r>
-              <a:rPr lang="en-US" smtClean="0"/>
+              <a:rPr lang="en-US"/>
               <a:t>Fourth level</a:t>
             </a:r>
           </a:p>
           <a:p>
             <a:pPr lvl="4"/>
             <a:r>
-              <a:rPr lang="en-US" smtClean="0"/>
+              <a:rPr lang="en-US"/>
               <a:t>Fifth level</a:t>
             </a:r>
-            <a:endParaRPr lang="en-US"/>
           </a:p>
         </p:txBody>
       </p:sp>
@@ -2584,7 +2581,7 @@
           <a:p>
             <a:pPr lvl="0"/>
             <a:r>
-              <a:rPr lang="en-US" smtClean="0"/>
+              <a:rPr lang="en-US"/>
               <a:t>Click to edit Master text styles</a:t>
             </a:r>
           </a:p>
@@ -2607,7 +2604,7 @@
           <a:p>
             <a:fld id="{78C97017-6FC3-485B-9764-EAC9E56C1D49}" type="datetimeFigureOut">
               <a:rPr lang="en-US" smtClean="0"/>
-              <a:t>10/16/2016</a:t>
+              <a:t>10/30/2018</a:t>
             </a:fld>
             <a:endParaRPr lang="en-US"/>
           </a:p>
@@ -2710,10 +2707,9 @@
           </a:lstStyle>
           <a:p>
             <a:r>
-              <a:rPr lang="en-US" smtClean="0"/>
+              <a:rPr lang="en-US"/>
               <a:t>Click to edit Master title style</a:t>
             </a:r>
-            <a:endParaRPr lang="en-US"/>
           </a:p>
         </p:txBody>
       </p:sp>
@@ -2837,7 +2833,7 @@
           <a:p>
             <a:pPr lvl="0"/>
             <a:r>
-              <a:rPr lang="en-US" smtClean="0"/>
+              <a:rPr lang="en-US"/>
               <a:t>Click to edit Master text styles</a:t>
             </a:r>
           </a:p>
@@ -2860,7 +2856,7 @@
           <a:p>
             <a:fld id="{78C97017-6FC3-485B-9764-EAC9E56C1D49}" type="datetimeFigureOut">
               <a:rPr lang="en-US" smtClean="0"/>
-              <a:t>10/16/2016</a:t>
+              <a:t>10/30/2018</a:t>
             </a:fld>
             <a:endParaRPr lang="en-US"/>
           </a:p>
@@ -2969,10 +2965,9 @@
           <a:lstStyle/>
           <a:p>
             <a:r>
-              <a:rPr lang="en-US" smtClean="0"/>
+              <a:rPr lang="en-US"/>
               <a:t>Click to edit Master title style</a:t>
             </a:r>
-            <a:endParaRPr lang="en-US"/>
           </a:p>
         </p:txBody>
       </p:sp>
@@ -3003,38 +2998,37 @@
           <a:p>
             <a:pPr lvl="0"/>
             <a:r>
-              <a:rPr lang="en-US" smtClean="0"/>
+              <a:rPr lang="en-US"/>
               <a:t>Click to edit Master text styles</a:t>
             </a:r>
           </a:p>
           <a:p>
             <a:pPr lvl="1"/>
             <a:r>
-              <a:rPr lang="en-US" smtClean="0"/>
+              <a:rPr lang="en-US"/>
               <a:t>Second level</a:t>
             </a:r>
           </a:p>
           <a:p>
             <a:pPr lvl="2"/>
             <a:r>
-              <a:rPr lang="en-US" smtClean="0"/>
+              <a:rPr lang="en-US"/>
               <a:t>Third level</a:t>
             </a:r>
           </a:p>
           <a:p>
             <a:pPr lvl="3"/>
             <a:r>
-              <a:rPr lang="en-US" smtClean="0"/>
+              <a:rPr lang="en-US"/>
               <a:t>Fourth level</a:t>
             </a:r>
           </a:p>
           <a:p>
             <a:pPr lvl="4"/>
             <a:r>
-              <a:rPr lang="en-US" smtClean="0"/>
+              <a:rPr lang="en-US"/>
               <a:t>Fifth level</a:t>
             </a:r>
-            <a:endParaRPr lang="en-US"/>
           </a:p>
         </p:txBody>
       </p:sp>
@@ -3073,7 +3067,7 @@
           <a:p>
             <a:fld id="{78C97017-6FC3-485B-9764-EAC9E56C1D49}" type="datetimeFigureOut">
               <a:rPr lang="en-US" smtClean="0"/>
-              <a:t>10/16/2016</a:t>
+              <a:t>10/30/2018</a:t>
             </a:fld>
             <a:endParaRPr lang="en-US"/>
           </a:p>
@@ -3492,7 +3486,7 @@
           <a:p>
             <a:pPr algn="ctr"/>
             <a:r>
-              <a:rPr lang="en-US" sz="1600" dirty="0" smtClean="0">
+              <a:rPr lang="en-US" sz="1600" dirty="0">
                 <a:solidFill>
                   <a:schemeClr val="bg1"/>
                 </a:solidFill>
@@ -3856,7 +3850,7 @@
           <a:p>
             <a:pPr algn="ctr"/>
             <a:r>
-              <a:rPr lang="en-US" sz="1600" dirty="0" smtClean="0">
+              <a:rPr lang="en-US" sz="1600" dirty="0">
                 <a:solidFill>
                   <a:schemeClr val="bg1"/>
                 </a:solidFill>
@@ -3967,7 +3961,7 @@
         </p:nvSpPr>
         <p:spPr>
           <a:xfrm>
-            <a:off x="5316783" y="607926"/>
+            <a:off x="5410200" y="607926"/>
             <a:ext cx="1093635" cy="346760"/>
           </a:xfrm>
           <a:prstGeom prst="rect">
@@ -4003,7 +3997,7 @@
           <a:p>
             <a:pPr algn="ctr"/>
             <a:r>
-              <a:rPr lang="en-US" sz="1600" dirty="0" smtClean="0">
+              <a:rPr lang="en-US" sz="1600" dirty="0">
                 <a:solidFill>
                   <a:schemeClr val="bg1"/>
                 </a:solidFill>
@@ -4026,7 +4020,7 @@
         </p:nvCxnSpPr>
         <p:spPr>
           <a:xfrm>
-            <a:off x="5863600" y="971597"/>
+            <a:off x="5957017" y="971597"/>
             <a:ext cx="0" cy="1723059"/>
           </a:xfrm>
           <a:prstGeom prst="line">
@@ -4063,7 +4057,7 @@
         </p:nvSpPr>
         <p:spPr>
           <a:xfrm>
-            <a:off x="5791592" y="1538408"/>
+            <a:off x="5885009" y="1538408"/>
             <a:ext cx="142006" cy="651394"/>
           </a:xfrm>
           <a:prstGeom prst="rect">
@@ -4151,7 +4145,7 @@
         <p:spPr>
           <a:xfrm>
             <a:off x="466818" y="1345880"/>
-            <a:ext cx="860170" cy="215444"/>
+            <a:ext cx="1109408" cy="646331"/>
           </a:xfrm>
           <a:prstGeom prst="rect">
             <a:avLst/>
@@ -4165,10 +4159,17 @@
           <a:lstStyle/>
           <a:p>
             <a:r>
-              <a:rPr lang="en-US" sz="1400" dirty="0" smtClean="0"/>
-              <a:t>delete 1</a:t>
-            </a:r>
-            <a:endParaRPr lang="en-US" sz="1400" dirty="0"/>
+              <a:rPr lang="en-US" sz="1400" dirty="0"/>
+              <a:t>delete-assignment as/lab1 </a:t>
+            </a:r>
+            <a:r>
+              <a:rPr lang="en-US" sz="1400" dirty="0" err="1"/>
+              <a:t>tg</a:t>
+            </a:r>
+            <a:r>
+              <a:rPr lang="en-US" sz="1400" dirty="0"/>
+              <a:t>/04a</a:t>
+            </a:r>
           </a:p>
         </p:txBody>
       </p:sp>
@@ -4217,7 +4218,7 @@
         <p:spPr>
           <a:xfrm>
             <a:off x="2166172" y="1453379"/>
-            <a:ext cx="1424846" cy="215444"/>
+            <a:ext cx="1424846" cy="646331"/>
           </a:xfrm>
           <a:prstGeom prst="rect">
             <a:avLst/>
@@ -4231,31 +4232,44 @@
           <a:lstStyle/>
           <a:p>
             <a:r>
-              <a:rPr lang="en-US" sz="1400" dirty="0" smtClean="0">
+              <a:rPr lang="en-US" sz="1400" dirty="0">
                 <a:solidFill>
                   <a:srgbClr val="0070C0"/>
                 </a:solidFill>
               </a:rPr>
-              <a:t>execute(“delete 1”)</a:t>
-            </a:r>
-            <a:endParaRPr lang="en-US" sz="1400" dirty="0">
-              <a:solidFill>
-                <a:srgbClr val="0070C0"/>
-              </a:solidFill>
-            </a:endParaRPr>
+              <a:t>execute(“delete-assignment as/lab1 </a:t>
+            </a:r>
+            <a:r>
+              <a:rPr lang="en-US" sz="1400" dirty="0" err="1">
+                <a:solidFill>
+                  <a:srgbClr val="0070C0"/>
+                </a:solidFill>
+              </a:rPr>
+              <a:t>tg</a:t>
+            </a:r>
+            <a:r>
+              <a:rPr lang="en-US" sz="1400" dirty="0">
+                <a:solidFill>
+                  <a:srgbClr val="0070C0"/>
+                </a:solidFill>
+              </a:rPr>
+              <a:t>/04a”)</a:t>
+            </a:r>
           </a:p>
         </p:txBody>
       </p:sp>
       <p:cxnSp>
         <p:nvCxnSpPr>
           <p:cNvPr id="28" name="Straight Arrow Connector 27"/>
-          <p:cNvCxnSpPr/>
+          <p:cNvCxnSpPr>
+            <a:cxnSpLocks/>
+          </p:cNvCxnSpPr>
           <p:nvPr/>
         </p:nvCxnSpPr>
         <p:spPr>
-          <a:xfrm>
-            <a:off x="3954408" y="1538409"/>
-            <a:ext cx="1837184" cy="0"/>
+          <a:xfrm flipV="1">
+            <a:off x="3954408" y="1538408"/>
+            <a:ext cx="1912992" cy="1"/>
           </a:xfrm>
           <a:prstGeom prst="straightConnector1">
             <a:avLst/>
@@ -4290,8 +4304,8 @@
         </p:nvSpPr>
         <p:spPr>
           <a:xfrm>
-            <a:off x="4299772" y="1542583"/>
-            <a:ext cx="1424846" cy="215444"/>
+            <a:off x="4018121" y="1579934"/>
+            <a:ext cx="1844464" cy="215444"/>
           </a:xfrm>
           <a:prstGeom prst="rect">
             <a:avLst/>
@@ -4305,26 +4319,37 @@
           <a:lstStyle/>
           <a:p>
             <a:r>
-              <a:rPr lang="en-US" sz="1400" dirty="0" err="1" smtClean="0">
+              <a:rPr lang="en-US" sz="1400" dirty="0" err="1">
                 <a:solidFill>
                   <a:srgbClr val="7030A0"/>
                 </a:solidFill>
               </a:rPr>
-              <a:t>deletePerson</a:t>
-            </a:r>
-            <a:r>
-              <a:rPr lang="en-US" sz="1400" dirty="0" smtClean="0">
+              <a:t>deleteAssignment</a:t>
+            </a:r>
+            <a:r>
+              <a:rPr lang="en-US" sz="1400" dirty="0">
                 <a:solidFill>
                   <a:srgbClr val="7030A0"/>
                 </a:solidFill>
               </a:rPr>
-              <a:t>(p)</a:t>
-            </a:r>
-            <a:endParaRPr lang="en-US" sz="1400" dirty="0">
-              <a:solidFill>
-                <a:srgbClr val="7030A0"/>
-              </a:solidFill>
-            </a:endParaRPr>
+              <a:t>(</a:t>
+            </a:r>
+            <a:r>
+              <a:rPr lang="en-US" sz="1400" dirty="0" err="1">
+                <a:solidFill>
+                  <a:srgbClr val="7030A0"/>
+                </a:solidFill>
+              </a:rPr>
+              <a:t>tg</a:t>
+            </a:r>
+            <a:r>
+              <a:rPr lang="en-US" sz="1400" dirty="0">
+                <a:solidFill>
+                  <a:srgbClr val="7030A0"/>
+                </a:solidFill>
+              </a:rPr>
+              <a:t>, as)</a:t>
+            </a:r>
           </a:p>
         </p:txBody>
       </p:sp>
@@ -4336,8 +4361,8 @@
         </p:nvSpPr>
         <p:spPr>
           <a:xfrm>
-            <a:off x="6074030" y="1687656"/>
-            <a:ext cx="2438400" cy="215444"/>
+            <a:off x="6096000" y="1687656"/>
+            <a:ext cx="2509735" cy="215444"/>
           </a:xfrm>
           <a:prstGeom prst="rect">
             <a:avLst/>
@@ -4351,7 +4376,7 @@
           <a:lstStyle/>
           <a:p>
             <a:r>
-              <a:rPr lang="en-US" sz="1400" dirty="0" smtClean="0">
+              <a:rPr lang="en-US" sz="1400" dirty="0">
                 <a:solidFill>
                   <a:schemeClr val="accent5">
                     <a:lumMod val="75000"/>
@@ -4361,17 +4386,17 @@
               <a:t>post(</a:t>
             </a:r>
             <a:r>
-              <a:rPr lang="en-US" sz="1400" dirty="0" err="1" smtClean="0">
+              <a:rPr lang="en-US" sz="1400" dirty="0" err="1">
                 <a:solidFill>
                   <a:schemeClr val="accent5">
                     <a:lumMod val="75000"/>
                   </a:schemeClr>
                 </a:solidFill>
               </a:rPr>
-              <a:t>AddressBookChangedEvent</a:t>
-            </a:r>
-            <a:r>
-              <a:rPr lang="en-US" sz="1400" dirty="0" smtClean="0">
+              <a:t>SuperTaClientChangedEvent</a:t>
+            </a:r>
+            <a:r>
+              <a:rPr lang="en-US" sz="1400" dirty="0">
                 <a:solidFill>
                   <a:schemeClr val="accent5">
                     <a:lumMod val="75000"/>
@@ -4380,26 +4405,21 @@
               </a:rPr>
               <a:t>)</a:t>
             </a:r>
-            <a:endParaRPr lang="en-US" sz="1400" dirty="0">
-              <a:solidFill>
-                <a:schemeClr val="accent5">
-                  <a:lumMod val="75000"/>
-                </a:schemeClr>
-              </a:solidFill>
-            </a:endParaRPr>
           </a:p>
         </p:txBody>
       </p:sp>
       <p:cxnSp>
         <p:nvCxnSpPr>
           <p:cNvPr id="34" name="Straight Arrow Connector 33"/>
-          <p:cNvCxnSpPr/>
+          <p:cNvCxnSpPr>
+            <a:cxnSpLocks/>
+          </p:cNvCxnSpPr>
           <p:nvPr/>
         </p:nvCxnSpPr>
         <p:spPr>
-          <a:xfrm>
-            <a:off x="3954408" y="2190681"/>
-            <a:ext cx="1837184" cy="0"/>
+          <a:xfrm flipV="1">
+            <a:off x="3954408" y="2189802"/>
+            <a:ext cx="1912992" cy="879"/>
           </a:xfrm>
           <a:prstGeom prst="straightConnector1">
             <a:avLst/>
@@ -4512,7 +4532,7 @@
         </p:nvSpPr>
         <p:spPr>
           <a:xfrm>
-            <a:off x="7696200" y="591251"/>
+            <a:off x="7789617" y="591251"/>
             <a:ext cx="1371600" cy="346760"/>
           </a:xfrm>
           <a:prstGeom prst="rect">
@@ -4552,7 +4572,7 @@
           <a:p>
             <a:pPr algn="ctr"/>
             <a:r>
-              <a:rPr lang="en-US" sz="1600" dirty="0" smtClean="0">
+              <a:rPr lang="en-US" sz="1600" dirty="0">
                 <a:solidFill>
                   <a:schemeClr val="bg1"/>
                 </a:solidFill>
@@ -4560,7 +4580,7 @@
               <a:t>:</a:t>
             </a:r>
             <a:r>
-              <a:rPr lang="en-US" sz="1600" dirty="0" err="1" smtClean="0">
+              <a:rPr lang="en-US" sz="1600" dirty="0" err="1">
                 <a:solidFill>
                   <a:schemeClr val="bg1"/>
                 </a:solidFill>
@@ -4583,7 +4603,7 @@
         </p:nvCxnSpPr>
         <p:spPr>
           <a:xfrm>
-            <a:off x="8616802" y="944305"/>
+            <a:off x="8710219" y="944305"/>
             <a:ext cx="0" cy="1723059"/>
           </a:xfrm>
           <a:prstGeom prst="line">
@@ -4622,7 +4642,7 @@
         </p:nvSpPr>
         <p:spPr>
           <a:xfrm>
-            <a:off x="8544794" y="1961202"/>
+            <a:off x="8638211" y="1961202"/>
             <a:ext cx="142006" cy="176787"/>
           </a:xfrm>
           <a:prstGeom prst="rect">
@@ -4677,7 +4697,7 @@
         </p:nvCxnSpPr>
         <p:spPr>
           <a:xfrm>
-            <a:off x="5943992" y="1961202"/>
+            <a:off x="6037409" y="1961202"/>
             <a:ext cx="2568438" cy="0"/>
           </a:xfrm>
           <a:prstGeom prst="straightConnector1">
@@ -4713,7 +4733,7 @@
         </p:nvCxnSpPr>
         <p:spPr>
           <a:xfrm>
-            <a:off x="5943992" y="2137989"/>
+            <a:off x="6037409" y="2137989"/>
             <a:ext cx="2549946" cy="0"/>
           </a:xfrm>
           <a:prstGeom prst="straightConnector1">
@@ -4793,7 +4813,7 @@
           <a:p>
             <a:pPr algn="ctr"/>
             <a:r>
-              <a:rPr lang="en-US" sz="1600" dirty="0" smtClean="0">
+              <a:rPr lang="en-US" sz="1600" dirty="0">
                 <a:solidFill>
                   <a:schemeClr val="bg1"/>
                 </a:solidFill>
@@ -4925,7 +4945,7 @@
           <a:lstStyle/>
           <a:p>
             <a:r>
-              <a:rPr lang="en-US" sz="1400" dirty="0" smtClean="0">
+              <a:rPr lang="en-US" sz="1400" dirty="0">
                 <a:solidFill>
                   <a:schemeClr val="accent5">
                     <a:lumMod val="75000"/>
@@ -4935,17 +4955,17 @@
               <a:t>post(</a:t>
             </a:r>
             <a:r>
-              <a:rPr lang="en-US" sz="1400" dirty="0" err="1" smtClean="0">
+              <a:rPr lang="en-US" sz="1400" dirty="0" err="1">
                 <a:solidFill>
                   <a:schemeClr val="accent5">
                     <a:lumMod val="75000"/>
                   </a:schemeClr>
                 </a:solidFill>
               </a:rPr>
-              <a:t>AddressBookChangedEvent</a:t>
-            </a:r>
-            <a:r>
-              <a:rPr lang="en-US" sz="1400" dirty="0" smtClean="0">
+              <a:t>SuperTaClientChangedEvent</a:t>
+            </a:r>
+            <a:r>
+              <a:rPr lang="en-US" sz="1400" dirty="0">
                 <a:solidFill>
                   <a:schemeClr val="accent5">
                     <a:lumMod val="75000"/>
@@ -4954,13 +4974,6 @@
               </a:rPr>
               <a:t>)</a:t>
             </a:r>
-            <a:endParaRPr lang="en-US" sz="1400" dirty="0">
-              <a:solidFill>
-                <a:schemeClr val="accent5">
-                  <a:lumMod val="75000"/>
-                </a:schemeClr>
-              </a:solidFill>
-            </a:endParaRPr>
           </a:p>
         </p:txBody>
       </p:sp>
@@ -5052,7 +5065,7 @@
           <a:p>
             <a:pPr algn="ctr"/>
             <a:r>
-              <a:rPr lang="en-US" sz="1600" dirty="0" smtClean="0">
+              <a:rPr lang="en-US" sz="1600" dirty="0">
                 <a:solidFill>
                   <a:schemeClr val="bg1"/>
                 </a:solidFill>
@@ -5060,7 +5073,7 @@
               <a:t>:</a:t>
             </a:r>
             <a:r>
-              <a:rPr lang="en-US" sz="1600" dirty="0" err="1" smtClean="0">
+              <a:rPr lang="en-US" sz="1600" dirty="0" err="1">
                 <a:solidFill>
                   <a:schemeClr val="bg1"/>
                 </a:solidFill>
@@ -5307,17 +5320,17 @@
           <a:lstStyle/>
           <a:p>
             <a:r>
-              <a:rPr lang="en-US" sz="1400" dirty="0" err="1" smtClean="0">
+              <a:rPr lang="en-US" sz="1400" dirty="0" err="1">
                 <a:solidFill>
                   <a:schemeClr val="accent6">
                     <a:lumMod val="75000"/>
                   </a:schemeClr>
                 </a:solidFill>
               </a:rPr>
-              <a:t>handleAddresssBookChangedEvent</a:t>
-            </a:r>
-            <a:r>
-              <a:rPr lang="en-US" sz="1400" dirty="0" smtClean="0">
+              <a:t>handleSuperTaClientChangedEvent</a:t>
+            </a:r>
+            <a:r>
+              <a:rPr lang="en-US" sz="1400" dirty="0">
                 <a:solidFill>
                   <a:schemeClr val="accent6">
                     <a:lumMod val="75000"/>
@@ -5326,13 +5339,6 @@
               </a:rPr>
               <a:t>()</a:t>
             </a:r>
-            <a:endParaRPr lang="en-US" sz="1400" dirty="0">
-              <a:solidFill>
-                <a:schemeClr val="accent6">
-                  <a:lumMod val="75000"/>
-                </a:schemeClr>
-              </a:solidFill>
-            </a:endParaRPr>
           </a:p>
         </p:txBody>
       </p:sp>
@@ -5417,7 +5423,7 @@
           <a:p>
             <a:pPr algn="ctr"/>
             <a:r>
-              <a:rPr lang="en-US" sz="1600" dirty="0" smtClean="0">
+              <a:rPr lang="en-US" sz="1600" dirty="0">
                 <a:solidFill>
                   <a:schemeClr val="bg1"/>
                 </a:solidFill>
@@ -5620,26 +5626,21 @@
           <a:lstStyle/>
           <a:p>
             <a:r>
-              <a:rPr lang="en-US" sz="1400" dirty="0" err="1" smtClean="0">
+              <a:rPr lang="en-US" sz="1400" dirty="0" err="1">
                 <a:solidFill>
                   <a:srgbClr val="00B050"/>
                 </a:solidFill>
               </a:rPr>
-              <a:t>handleAddresssBookChangedEvent</a:t>
-            </a:r>
-            <a:r>
-              <a:rPr lang="en-US" sz="1400" dirty="0" smtClean="0">
+              <a:t>handleSuperTaClientChangedEvent</a:t>
+            </a:r>
+            <a:r>
+              <a:rPr lang="en-US" sz="1400" dirty="0">
                 <a:solidFill>
                   <a:srgbClr val="00B050"/>
                 </a:solidFill>
               </a:rPr>
               <a:t>()</a:t>
             </a:r>
-            <a:endParaRPr lang="en-US" sz="1400" dirty="0">
-              <a:solidFill>
-                <a:srgbClr val="00B050"/>
-              </a:solidFill>
-            </a:endParaRPr>
           </a:p>
         </p:txBody>
       </p:sp>
@@ -5826,18 +5827,13 @@
           <a:p>
             <a:pPr algn="r"/>
             <a:r>
-              <a:rPr lang="en-US" sz="1400" dirty="0" smtClean="0">
+              <a:rPr lang="en-US" sz="1400" dirty="0">
                 <a:solidFill>
                   <a:srgbClr val="00B050"/>
                 </a:solidFill>
               </a:rPr>
               <a:t>Update status bar</a:t>
             </a:r>
-            <a:endParaRPr lang="en-US" sz="1400" dirty="0">
-              <a:solidFill>
-                <a:srgbClr val="00B050"/>
-              </a:solidFill>
-            </a:endParaRPr>
           </a:p>
         </p:txBody>
       </p:sp>
@@ -6027,7 +6023,7 @@
           <a:lstStyle/>
           <a:p>
             <a:r>
-              <a:rPr lang="en-US" sz="1400" dirty="0" smtClean="0">
+              <a:rPr lang="en-US" sz="1400" dirty="0">
                 <a:solidFill>
                   <a:schemeClr val="accent6">
                     <a:lumMod val="75000"/>
@@ -6037,7 +6033,7 @@
               <a:t>Save </a:t>
             </a:r>
             <a:br>
-              <a:rPr lang="en-US" sz="1400" dirty="0" smtClean="0">
+              <a:rPr lang="en-US" sz="1400" dirty="0">
                 <a:solidFill>
                   <a:schemeClr val="accent6">
                     <a:lumMod val="75000"/>
@@ -6046,7 +6042,7 @@
               </a:rPr>
             </a:br>
             <a:r>
-              <a:rPr lang="en-US" sz="1400" dirty="0" smtClean="0">
+              <a:rPr lang="en-US" sz="1400" dirty="0">
                 <a:solidFill>
                   <a:schemeClr val="accent6">
                     <a:lumMod val="75000"/>
@@ -6055,20 +6051,13 @@
               </a:rPr>
               <a:t>to file</a:t>
             </a:r>
-            <a:endParaRPr lang="en-US" sz="1400" dirty="0">
-              <a:solidFill>
-                <a:schemeClr val="accent6">
-                  <a:lumMod val="75000"/>
-                </a:schemeClr>
-              </a:solidFill>
-            </a:endParaRPr>
           </a:p>
         </p:txBody>
       </p:sp>
     </p:spTree>
     <p:extLst>
       <p:ext uri="{BB962C8B-B14F-4D97-AF65-F5344CB8AC3E}">
-        <p14:creationId xmlns:p14="http://schemas.microsoft.com/office/powerpoint/2010/main" val="4023378879"/>
+        <p14:creationId xmlns:p14="http://schemas.microsoft.com/office/powerpoint/2010/main" val="3235349793"/>
       </p:ext>
     </p:extLst>
   </p:cSld>

</xml_diff>

<commit_message>
Update DG with MarkAttendanceCommand implementation
</commit_message>
<xml_diff>
--- a/docs/diagrams/HighLevelSequenceDiagrams.pptx
+++ b/docs/diagrams/HighLevelSequenceDiagrams.pptx
@@ -208,7 +208,7 @@
           <a:p>
             <a:fld id="{F5CC4B3F-88C1-4FFA-B1B6-F41C21DC6924}" type="datetimeFigureOut">
               <a:rPr lang="en-US" smtClean="0"/>
-              <a:t>10/30/2018</a:t>
+              <a:t>11/11/18</a:t>
             </a:fld>
             <a:endParaRPr lang="en-US"/>
           </a:p>
@@ -654,7 +654,7 @@
           <a:p>
             <a:fld id="{78C97017-6FC3-485B-9764-EAC9E56C1D49}" type="datetimeFigureOut">
               <a:rPr lang="en-US" smtClean="0"/>
-              <a:t>10/30/2018</a:t>
+              <a:t>11/11/18</a:t>
             </a:fld>
             <a:endParaRPr lang="en-US"/>
           </a:p>
@@ -822,7 +822,7 @@
           <a:p>
             <a:fld id="{78C97017-6FC3-485B-9764-EAC9E56C1D49}" type="datetimeFigureOut">
               <a:rPr lang="en-US" smtClean="0"/>
-              <a:t>10/30/2018</a:t>
+              <a:t>11/11/18</a:t>
             </a:fld>
             <a:endParaRPr lang="en-US"/>
           </a:p>
@@ -1000,7 +1000,7 @@
           <a:p>
             <a:fld id="{78C97017-6FC3-485B-9764-EAC9E56C1D49}" type="datetimeFigureOut">
               <a:rPr lang="en-US" smtClean="0"/>
-              <a:t>10/30/2018</a:t>
+              <a:t>11/11/18</a:t>
             </a:fld>
             <a:endParaRPr lang="en-US"/>
           </a:p>
@@ -1168,7 +1168,7 @@
           <a:p>
             <a:fld id="{78C97017-6FC3-485B-9764-EAC9E56C1D49}" type="datetimeFigureOut">
               <a:rPr lang="en-US" smtClean="0"/>
-              <a:t>10/30/2018</a:t>
+              <a:t>11/11/18</a:t>
             </a:fld>
             <a:endParaRPr lang="en-US"/>
           </a:p>
@@ -1413,7 +1413,7 @@
           <a:p>
             <a:fld id="{78C97017-6FC3-485B-9764-EAC9E56C1D49}" type="datetimeFigureOut">
               <a:rPr lang="en-US" smtClean="0"/>
-              <a:t>10/30/2018</a:t>
+              <a:t>11/11/18</a:t>
             </a:fld>
             <a:endParaRPr lang="en-US"/>
           </a:p>
@@ -1698,7 +1698,7 @@
           <a:p>
             <a:fld id="{78C97017-6FC3-485B-9764-EAC9E56C1D49}" type="datetimeFigureOut">
               <a:rPr lang="en-US" smtClean="0"/>
-              <a:t>10/30/2018</a:t>
+              <a:t>11/11/18</a:t>
             </a:fld>
             <a:endParaRPr lang="en-US"/>
           </a:p>
@@ -2117,7 +2117,7 @@
           <a:p>
             <a:fld id="{78C97017-6FC3-485B-9764-EAC9E56C1D49}" type="datetimeFigureOut">
               <a:rPr lang="en-US" smtClean="0"/>
-              <a:t>10/30/2018</a:t>
+              <a:t>11/11/18</a:t>
             </a:fld>
             <a:endParaRPr lang="en-US"/>
           </a:p>
@@ -2234,7 +2234,7 @@
           <a:p>
             <a:fld id="{78C97017-6FC3-485B-9764-EAC9E56C1D49}" type="datetimeFigureOut">
               <a:rPr lang="en-US" smtClean="0"/>
-              <a:t>10/30/2018</a:t>
+              <a:t>11/11/18</a:t>
             </a:fld>
             <a:endParaRPr lang="en-US"/>
           </a:p>
@@ -2329,7 +2329,7 @@
           <a:p>
             <a:fld id="{78C97017-6FC3-485B-9764-EAC9E56C1D49}" type="datetimeFigureOut">
               <a:rPr lang="en-US" smtClean="0"/>
-              <a:t>10/30/2018</a:t>
+              <a:t>11/11/18</a:t>
             </a:fld>
             <a:endParaRPr lang="en-US"/>
           </a:p>
@@ -2604,7 +2604,7 @@
           <a:p>
             <a:fld id="{78C97017-6FC3-485B-9764-EAC9E56C1D49}" type="datetimeFigureOut">
               <a:rPr lang="en-US" smtClean="0"/>
-              <a:t>10/30/2018</a:t>
+              <a:t>11/11/18</a:t>
             </a:fld>
             <a:endParaRPr lang="en-US"/>
           </a:p>
@@ -2856,7 +2856,7 @@
           <a:p>
             <a:fld id="{78C97017-6FC3-485B-9764-EAC9E56C1D49}" type="datetimeFigureOut">
               <a:rPr lang="en-US" smtClean="0"/>
-              <a:t>10/30/2018</a:t>
+              <a:t>11/11/18</a:t>
             </a:fld>
             <a:endParaRPr lang="en-US"/>
           </a:p>
@@ -3067,7 +3067,7 @@
           <a:p>
             <a:fld id="{78C97017-6FC3-485B-9764-EAC9E56C1D49}" type="datetimeFigureOut">
               <a:rPr lang="en-US" smtClean="0"/>
-              <a:t>10/30/2018</a:t>
+              <a:t>11/11/18</a:t>
             </a:fld>
             <a:endParaRPr lang="en-US"/>
           </a:p>

</xml_diff>

<commit_message>
Fix existing errors present in DG
</commit_message>
<xml_diff>
--- a/docs/diagrams/HighLevelSequenceDiagrams.pptx
+++ b/docs/diagrams/HighLevelSequenceDiagrams.pptx
@@ -5,10 +5,11 @@
     <p:sldMasterId id="2147483648" r:id="rId1"/>
   </p:sldMasterIdLst>
   <p:notesMasterIdLst>
-    <p:notesMasterId r:id="rId3"/>
+    <p:notesMasterId r:id="rId4"/>
   </p:notesMasterIdLst>
   <p:sldIdLst>
     <p:sldId id="268" r:id="rId2"/>
+    <p:sldId id="269" r:id="rId3"/>
   </p:sldIdLst>
   <p:sldSz cx="9144000" cy="6858000" type="screen4x3"/>
   <p:notesSz cx="6858000" cy="9144000"/>
@@ -208,7 +209,7 @@
           <a:p>
             <a:fld id="{F5CC4B3F-88C1-4FFA-B1B6-F41C21DC6924}" type="datetimeFigureOut">
               <a:rPr lang="en-US" smtClean="0"/>
-              <a:t>11/11/18</a:t>
+              <a:t>11/12/18</a:t>
             </a:fld>
             <a:endParaRPr lang="en-US"/>
           </a:p>
@@ -654,7 +655,7 @@
           <a:p>
             <a:fld id="{78C97017-6FC3-485B-9764-EAC9E56C1D49}" type="datetimeFigureOut">
               <a:rPr lang="en-US" smtClean="0"/>
-              <a:t>11/11/18</a:t>
+              <a:t>11/12/18</a:t>
             </a:fld>
             <a:endParaRPr lang="en-US"/>
           </a:p>
@@ -822,7 +823,7 @@
           <a:p>
             <a:fld id="{78C97017-6FC3-485B-9764-EAC9E56C1D49}" type="datetimeFigureOut">
               <a:rPr lang="en-US" smtClean="0"/>
-              <a:t>11/11/18</a:t>
+              <a:t>11/12/18</a:t>
             </a:fld>
             <a:endParaRPr lang="en-US"/>
           </a:p>
@@ -1000,7 +1001,7 @@
           <a:p>
             <a:fld id="{78C97017-6FC3-485B-9764-EAC9E56C1D49}" type="datetimeFigureOut">
               <a:rPr lang="en-US" smtClean="0"/>
-              <a:t>11/11/18</a:t>
+              <a:t>11/12/18</a:t>
             </a:fld>
             <a:endParaRPr lang="en-US"/>
           </a:p>
@@ -1168,7 +1169,7 @@
           <a:p>
             <a:fld id="{78C97017-6FC3-485B-9764-EAC9E56C1D49}" type="datetimeFigureOut">
               <a:rPr lang="en-US" smtClean="0"/>
-              <a:t>11/11/18</a:t>
+              <a:t>11/12/18</a:t>
             </a:fld>
             <a:endParaRPr lang="en-US"/>
           </a:p>
@@ -1413,7 +1414,7 @@
           <a:p>
             <a:fld id="{78C97017-6FC3-485B-9764-EAC9E56C1D49}" type="datetimeFigureOut">
               <a:rPr lang="en-US" smtClean="0"/>
-              <a:t>11/11/18</a:t>
+              <a:t>11/12/18</a:t>
             </a:fld>
             <a:endParaRPr lang="en-US"/>
           </a:p>
@@ -1698,7 +1699,7 @@
           <a:p>
             <a:fld id="{78C97017-6FC3-485B-9764-EAC9E56C1D49}" type="datetimeFigureOut">
               <a:rPr lang="en-US" smtClean="0"/>
-              <a:t>11/11/18</a:t>
+              <a:t>11/12/18</a:t>
             </a:fld>
             <a:endParaRPr lang="en-US"/>
           </a:p>
@@ -2117,7 +2118,7 @@
           <a:p>
             <a:fld id="{78C97017-6FC3-485B-9764-EAC9E56C1D49}" type="datetimeFigureOut">
               <a:rPr lang="en-US" smtClean="0"/>
-              <a:t>11/11/18</a:t>
+              <a:t>11/12/18</a:t>
             </a:fld>
             <a:endParaRPr lang="en-US"/>
           </a:p>
@@ -2234,7 +2235,7 @@
           <a:p>
             <a:fld id="{78C97017-6FC3-485B-9764-EAC9E56C1D49}" type="datetimeFigureOut">
               <a:rPr lang="en-US" smtClean="0"/>
-              <a:t>11/11/18</a:t>
+              <a:t>11/12/18</a:t>
             </a:fld>
             <a:endParaRPr lang="en-US"/>
           </a:p>
@@ -2329,7 +2330,7 @@
           <a:p>
             <a:fld id="{78C97017-6FC3-485B-9764-EAC9E56C1D49}" type="datetimeFigureOut">
               <a:rPr lang="en-US" smtClean="0"/>
-              <a:t>11/11/18</a:t>
+              <a:t>11/12/18</a:t>
             </a:fld>
             <a:endParaRPr lang="en-US"/>
           </a:p>
@@ -2604,7 +2605,7 @@
           <a:p>
             <a:fld id="{78C97017-6FC3-485B-9764-EAC9E56C1D49}" type="datetimeFigureOut">
               <a:rPr lang="en-US" smtClean="0"/>
-              <a:t>11/11/18</a:t>
+              <a:t>11/12/18</a:t>
             </a:fld>
             <a:endParaRPr lang="en-US"/>
           </a:p>
@@ -2856,7 +2857,7 @@
           <a:p>
             <a:fld id="{78C97017-6FC3-485B-9764-EAC9E56C1D49}" type="datetimeFigureOut">
               <a:rPr lang="en-US" smtClean="0"/>
-              <a:t>11/11/18</a:t>
+              <a:t>11/12/18</a:t>
             </a:fld>
             <a:endParaRPr lang="en-US"/>
           </a:p>
@@ -3067,7 +3068,7 @@
           <a:p>
             <a:fld id="{78C97017-6FC3-485B-9764-EAC9E56C1D49}" type="datetimeFigureOut">
               <a:rPr lang="en-US" smtClean="0"/>
-              <a:t>11/11/18</a:t>
+              <a:t>11/12/18</a:t>
             </a:fld>
             <a:endParaRPr lang="en-US"/>
           </a:p>
@@ -6058,6 +6059,2613 @@
     <p:extLst>
       <p:ext uri="{BB962C8B-B14F-4D97-AF65-F5344CB8AC3E}">
         <p14:creationId xmlns:p14="http://schemas.microsoft.com/office/powerpoint/2010/main" val="3235349793"/>
+      </p:ext>
+    </p:extLst>
+  </p:cSld>
+  <p:clrMapOvr>
+    <a:masterClrMapping/>
+  </p:clrMapOvr>
+</p:sld>
+</file>
+
+<file path=ppt/slides/slide2.xml><?xml version="1.0" encoding="utf-8"?>
+<p:sld xmlns:a="http://schemas.openxmlformats.org/drawingml/2006/main" xmlns:r="http://schemas.openxmlformats.org/officeDocument/2006/relationships" xmlns:p="http://schemas.openxmlformats.org/presentationml/2006/main">
+  <p:cSld>
+    <p:spTree>
+      <p:nvGrpSpPr>
+        <p:cNvPr id="1" name=""/>
+        <p:cNvGrpSpPr/>
+        <p:nvPr/>
+      </p:nvGrpSpPr>
+      <p:grpSpPr>
+        <a:xfrm>
+          <a:off x="0" y="0"/>
+          <a:ext cx="0" cy="0"/>
+          <a:chOff x="0" y="0"/>
+          <a:chExt cx="0" cy="0"/>
+        </a:xfrm>
+      </p:grpSpPr>
+      <p:sp>
+        <p:nvSpPr>
+          <p:cNvPr id="2" name="Rectangle 62"/>
+          <p:cNvSpPr/>
+          <p:nvPr/>
+        </p:nvSpPr>
+        <p:spPr>
+          <a:xfrm>
+            <a:off x="1111860" y="607926"/>
+            <a:ext cx="1093635" cy="346760"/>
+          </a:xfrm>
+          <a:prstGeom prst="rect">
+            <a:avLst/>
+          </a:prstGeom>
+          <a:solidFill>
+            <a:srgbClr val="00B050"/>
+          </a:solidFill>
+          <a:ln w="19050">
+            <a:solidFill>
+              <a:srgbClr val="00B050"/>
+            </a:solidFill>
+          </a:ln>
+          <a:effectLst/>
+        </p:spPr>
+        <p:style>
+          <a:lnRef idx="1">
+            <a:schemeClr val="accent2"/>
+          </a:lnRef>
+          <a:fillRef idx="2">
+            <a:schemeClr val="accent2"/>
+          </a:fillRef>
+          <a:effectRef idx="1">
+            <a:schemeClr val="accent2"/>
+          </a:effectRef>
+          <a:fontRef idx="minor">
+            <a:schemeClr val="dk1"/>
+          </a:fontRef>
+        </p:style>
+        <p:txBody>
+          <a:bodyPr rtlCol="0" anchor="ctr"/>
+          <a:lstStyle/>
+          <a:p>
+            <a:pPr algn="ctr"/>
+            <a:r>
+              <a:rPr lang="en-US" sz="1600" dirty="0">
+                <a:solidFill>
+                  <a:schemeClr val="bg1"/>
+                </a:solidFill>
+              </a:rPr>
+              <a:t>:UI</a:t>
+            </a:r>
+            <a:endParaRPr lang="en-SG" sz="1600" dirty="0">
+              <a:solidFill>
+                <a:schemeClr val="bg1"/>
+              </a:solidFill>
+            </a:endParaRPr>
+          </a:p>
+        </p:txBody>
+      </p:sp>
+      <p:cxnSp>
+        <p:nvCxnSpPr>
+          <p:cNvPr id="5" name="Straight Connector 4"/>
+          <p:cNvCxnSpPr/>
+          <p:nvPr/>
+        </p:nvCxnSpPr>
+        <p:spPr>
+          <a:xfrm>
+            <a:off x="1658677" y="971597"/>
+            <a:ext cx="0" cy="1723059"/>
+          </a:xfrm>
+          <a:prstGeom prst="line">
+            <a:avLst/>
+          </a:prstGeom>
+          <a:ln w="19050">
+            <a:solidFill>
+              <a:srgbClr val="00B050"/>
+            </a:solidFill>
+            <a:prstDash val="sysDash"/>
+          </a:ln>
+          <a:effectLst/>
+        </p:spPr>
+        <p:style>
+          <a:lnRef idx="1">
+            <a:schemeClr val="accent1"/>
+          </a:lnRef>
+          <a:fillRef idx="2">
+            <a:schemeClr val="accent1"/>
+          </a:fillRef>
+          <a:effectRef idx="1">
+            <a:schemeClr val="accent1"/>
+          </a:effectRef>
+          <a:fontRef idx="minor">
+            <a:schemeClr val="dk1"/>
+          </a:fontRef>
+        </p:style>
+      </p:cxnSp>
+      <p:sp>
+        <p:nvSpPr>
+          <p:cNvPr id="6" name="Rectangle 5"/>
+          <p:cNvSpPr/>
+          <p:nvPr/>
+        </p:nvSpPr>
+        <p:spPr>
+          <a:xfrm>
+            <a:off x="1586669" y="1322292"/>
+            <a:ext cx="152400" cy="1019910"/>
+          </a:xfrm>
+          <a:prstGeom prst="rect">
+            <a:avLst/>
+          </a:prstGeom>
+          <a:solidFill>
+            <a:srgbClr val="00B050"/>
+          </a:solidFill>
+          <a:ln>
+            <a:solidFill>
+              <a:srgbClr val="00B050"/>
+            </a:solidFill>
+          </a:ln>
+          <a:effectLst/>
+        </p:spPr>
+        <p:style>
+          <a:lnRef idx="1">
+            <a:schemeClr val="accent3"/>
+          </a:lnRef>
+          <a:fillRef idx="2">
+            <a:schemeClr val="accent3"/>
+          </a:fillRef>
+          <a:effectRef idx="1">
+            <a:schemeClr val="accent3"/>
+          </a:effectRef>
+          <a:fontRef idx="minor">
+            <a:schemeClr val="dk1"/>
+          </a:fontRef>
+        </p:style>
+        <p:txBody>
+          <a:bodyPr rtlCol="0" anchor="ctr"/>
+          <a:lstStyle/>
+          <a:p>
+            <a:pPr algn="ctr"/>
+            <a:endParaRPr lang="en-SG" sz="1400">
+              <a:solidFill>
+                <a:schemeClr val="dk1"/>
+              </a:solidFill>
+            </a:endParaRPr>
+          </a:p>
+        </p:txBody>
+      </p:sp>
+      <p:grpSp>
+        <p:nvGrpSpPr>
+          <p:cNvPr id="7" name="Actor"/>
+          <p:cNvGrpSpPr/>
+          <p:nvPr/>
+        </p:nvGrpSpPr>
+        <p:grpSpPr>
+          <a:xfrm>
+            <a:off x="152400" y="533400"/>
+            <a:ext cx="324036" cy="573410"/>
+            <a:chOff x="3239901" y="4149080"/>
+            <a:chExt cx="648072" cy="1146820"/>
+          </a:xfrm>
+        </p:grpSpPr>
+        <p:sp>
+          <p:nvSpPr>
+            <p:cNvPr id="8" name="Flowchart: Connector 7"/>
+            <p:cNvSpPr/>
+            <p:nvPr/>
+          </p:nvSpPr>
+          <p:spPr>
+            <a:xfrm>
+              <a:off x="3419872" y="4149080"/>
+              <a:ext cx="288032" cy="288032"/>
+            </a:xfrm>
+            <a:prstGeom prst="flowChartConnector">
+              <a:avLst/>
+            </a:prstGeom>
+            <a:solidFill>
+              <a:schemeClr val="bg1">
+                <a:lumMod val="85000"/>
+              </a:schemeClr>
+            </a:solidFill>
+            <a:ln w="28575">
+              <a:solidFill>
+                <a:schemeClr val="tx1"/>
+              </a:solidFill>
+            </a:ln>
+            <a:effectLst/>
+          </p:spPr>
+          <p:style>
+            <a:lnRef idx="1">
+              <a:schemeClr val="accent4"/>
+            </a:lnRef>
+            <a:fillRef idx="2">
+              <a:schemeClr val="accent4"/>
+            </a:fillRef>
+            <a:effectRef idx="1">
+              <a:schemeClr val="accent4"/>
+            </a:effectRef>
+            <a:fontRef idx="minor">
+              <a:schemeClr val="dk1"/>
+            </a:fontRef>
+          </p:style>
+          <p:txBody>
+            <a:bodyPr rtlCol="0" anchor="ctr"/>
+            <a:lstStyle/>
+            <a:p>
+              <a:pPr algn="ctr"/>
+              <a:endParaRPr lang="en-SG"/>
+            </a:p>
+          </p:txBody>
+        </p:sp>
+        <p:cxnSp>
+          <p:nvCxnSpPr>
+            <p:cNvPr id="9" name="Straight Connector 8"/>
+            <p:cNvCxnSpPr>
+              <a:stCxn id="8" idx="4"/>
+            </p:cNvCxnSpPr>
+            <p:nvPr/>
+          </p:nvCxnSpPr>
+          <p:spPr>
+            <a:xfrm>
+              <a:off x="3563888" y="4437112"/>
+              <a:ext cx="0" cy="504056"/>
+            </a:xfrm>
+            <a:prstGeom prst="line">
+              <a:avLst/>
+            </a:prstGeom>
+            <a:ln w="28575">
+              <a:solidFill>
+                <a:schemeClr val="tx1"/>
+              </a:solidFill>
+            </a:ln>
+            <a:effectLst/>
+          </p:spPr>
+          <p:style>
+            <a:lnRef idx="1">
+              <a:schemeClr val="accent4"/>
+            </a:lnRef>
+            <a:fillRef idx="2">
+              <a:schemeClr val="accent4"/>
+            </a:fillRef>
+            <a:effectRef idx="1">
+              <a:schemeClr val="accent4"/>
+            </a:effectRef>
+            <a:fontRef idx="minor">
+              <a:schemeClr val="dk1"/>
+            </a:fontRef>
+          </p:style>
+        </p:cxnSp>
+        <p:sp>
+          <p:nvSpPr>
+            <p:cNvPr id="10" name="Freeform 9"/>
+            <p:cNvSpPr/>
+            <p:nvPr/>
+          </p:nvSpPr>
+          <p:spPr>
+            <a:xfrm>
+              <a:off x="3324225" y="4933950"/>
+              <a:ext cx="479425" cy="361950"/>
+            </a:xfrm>
+            <a:custGeom>
+              <a:avLst/>
+              <a:gdLst>
+                <a:gd name="connsiteX0" fmla="*/ 0 w 479425"/>
+                <a:gd name="connsiteY0" fmla="*/ 355600 h 361950"/>
+                <a:gd name="connsiteX1" fmla="*/ 241300 w 479425"/>
+                <a:gd name="connsiteY1" fmla="*/ 0 h 361950"/>
+                <a:gd name="connsiteX2" fmla="*/ 479425 w 479425"/>
+                <a:gd name="connsiteY2" fmla="*/ 361950 h 361950"/>
+              </a:gdLst>
+              <a:ahLst/>
+              <a:cxnLst>
+                <a:cxn ang="0">
+                  <a:pos x="connsiteX0" y="connsiteY0"/>
+                </a:cxn>
+                <a:cxn ang="0">
+                  <a:pos x="connsiteX1" y="connsiteY1"/>
+                </a:cxn>
+                <a:cxn ang="0">
+                  <a:pos x="connsiteX2" y="connsiteY2"/>
+                </a:cxn>
+              </a:cxnLst>
+              <a:rect l="l" t="t" r="r" b="b"/>
+              <a:pathLst>
+                <a:path w="479425" h="361950">
+                  <a:moveTo>
+                    <a:pt x="0" y="355600"/>
+                  </a:moveTo>
+                  <a:lnTo>
+                    <a:pt x="241300" y="0"/>
+                  </a:lnTo>
+                  <a:lnTo>
+                    <a:pt x="479425" y="361950"/>
+                  </a:lnTo>
+                </a:path>
+              </a:pathLst>
+            </a:custGeom>
+            <a:noFill/>
+            <a:ln w="28575">
+              <a:solidFill>
+                <a:schemeClr val="tx1"/>
+              </a:solidFill>
+            </a:ln>
+            <a:effectLst/>
+          </p:spPr>
+          <p:style>
+            <a:lnRef idx="1">
+              <a:schemeClr val="accent4"/>
+            </a:lnRef>
+            <a:fillRef idx="2">
+              <a:schemeClr val="accent4"/>
+            </a:fillRef>
+            <a:effectRef idx="1">
+              <a:schemeClr val="accent4"/>
+            </a:effectRef>
+            <a:fontRef idx="minor">
+              <a:schemeClr val="dk1"/>
+            </a:fontRef>
+          </p:style>
+          <p:txBody>
+            <a:bodyPr rtlCol="0" anchor="ctr"/>
+            <a:lstStyle/>
+            <a:p>
+              <a:pPr algn="ctr"/>
+              <a:endParaRPr lang="en-SG"/>
+            </a:p>
+          </p:txBody>
+        </p:sp>
+        <p:cxnSp>
+          <p:nvCxnSpPr>
+            <p:cNvPr id="11" name="Straight Connector 10"/>
+            <p:cNvCxnSpPr/>
+            <p:nvPr/>
+          </p:nvCxnSpPr>
+          <p:spPr>
+            <a:xfrm>
+              <a:off x="3239901" y="4509120"/>
+              <a:ext cx="648072" cy="0"/>
+            </a:xfrm>
+            <a:prstGeom prst="line">
+              <a:avLst/>
+            </a:prstGeom>
+            <a:ln w="28575">
+              <a:solidFill>
+                <a:schemeClr val="tx1"/>
+              </a:solidFill>
+            </a:ln>
+            <a:effectLst/>
+          </p:spPr>
+          <p:style>
+            <a:lnRef idx="1">
+              <a:schemeClr val="accent4"/>
+            </a:lnRef>
+            <a:fillRef idx="2">
+              <a:schemeClr val="accent4"/>
+            </a:fillRef>
+            <a:effectRef idx="1">
+              <a:schemeClr val="accent4"/>
+            </a:effectRef>
+            <a:fontRef idx="minor">
+              <a:schemeClr val="dk1"/>
+            </a:fontRef>
+          </p:style>
+        </p:cxnSp>
+      </p:grpSp>
+      <p:sp>
+        <p:nvSpPr>
+          <p:cNvPr id="16" name="Rectangle 62"/>
+          <p:cNvSpPr/>
+          <p:nvPr/>
+        </p:nvSpPr>
+        <p:spPr>
+          <a:xfrm>
+            <a:off x="3335583" y="611613"/>
+            <a:ext cx="1093635" cy="346760"/>
+          </a:xfrm>
+          <a:prstGeom prst="rect">
+            <a:avLst/>
+          </a:prstGeom>
+          <a:solidFill>
+            <a:srgbClr val="0070C0"/>
+          </a:solidFill>
+          <a:ln w="19050">
+            <a:solidFill>
+              <a:srgbClr val="0070C0"/>
+            </a:solidFill>
+          </a:ln>
+          <a:effectLst/>
+        </p:spPr>
+        <p:style>
+          <a:lnRef idx="1">
+            <a:schemeClr val="accent2"/>
+          </a:lnRef>
+          <a:fillRef idx="2">
+            <a:schemeClr val="accent2"/>
+          </a:fillRef>
+          <a:effectRef idx="1">
+            <a:schemeClr val="accent2"/>
+          </a:effectRef>
+          <a:fontRef idx="minor">
+            <a:schemeClr val="dk1"/>
+          </a:fontRef>
+        </p:style>
+        <p:txBody>
+          <a:bodyPr rtlCol="0" anchor="ctr"/>
+          <a:lstStyle/>
+          <a:p>
+            <a:pPr algn="ctr"/>
+            <a:r>
+              <a:rPr lang="en-US" sz="1600" dirty="0">
+                <a:solidFill>
+                  <a:schemeClr val="bg1"/>
+                </a:solidFill>
+              </a:rPr>
+              <a:t>:Logic</a:t>
+            </a:r>
+            <a:endParaRPr lang="en-SG" sz="1600" dirty="0">
+              <a:solidFill>
+                <a:schemeClr val="bg1"/>
+              </a:solidFill>
+            </a:endParaRPr>
+          </a:p>
+        </p:txBody>
+      </p:sp>
+      <p:cxnSp>
+        <p:nvCxnSpPr>
+          <p:cNvPr id="17" name="Straight Connector 16"/>
+          <p:cNvCxnSpPr/>
+          <p:nvPr/>
+        </p:nvCxnSpPr>
+        <p:spPr>
+          <a:xfrm>
+            <a:off x="3882400" y="975284"/>
+            <a:ext cx="0" cy="1723059"/>
+          </a:xfrm>
+          <a:prstGeom prst="line">
+            <a:avLst/>
+          </a:prstGeom>
+          <a:ln w="19050">
+            <a:solidFill>
+              <a:srgbClr val="0070C0"/>
+            </a:solidFill>
+            <a:prstDash val="sysDash"/>
+          </a:ln>
+          <a:effectLst/>
+        </p:spPr>
+        <p:style>
+          <a:lnRef idx="1">
+            <a:schemeClr val="accent1"/>
+          </a:lnRef>
+          <a:fillRef idx="2">
+            <a:schemeClr val="accent1"/>
+          </a:fillRef>
+          <a:effectRef idx="1">
+            <a:schemeClr val="accent1"/>
+          </a:effectRef>
+          <a:fontRef idx="minor">
+            <a:schemeClr val="dk1"/>
+          </a:fontRef>
+        </p:style>
+      </p:cxnSp>
+      <p:sp>
+        <p:nvSpPr>
+          <p:cNvPr id="18" name="Rectangle 17"/>
+          <p:cNvSpPr/>
+          <p:nvPr/>
+        </p:nvSpPr>
+        <p:spPr>
+          <a:xfrm>
+            <a:off x="3810392" y="1433477"/>
+            <a:ext cx="144016" cy="832525"/>
+          </a:xfrm>
+          <a:prstGeom prst="rect">
+            <a:avLst/>
+          </a:prstGeom>
+          <a:solidFill>
+            <a:srgbClr val="0070C0"/>
+          </a:solidFill>
+          <a:ln>
+            <a:solidFill>
+              <a:srgbClr val="0070C0"/>
+            </a:solidFill>
+          </a:ln>
+          <a:effectLst/>
+        </p:spPr>
+        <p:style>
+          <a:lnRef idx="1">
+            <a:schemeClr val="accent3"/>
+          </a:lnRef>
+          <a:fillRef idx="2">
+            <a:schemeClr val="accent3"/>
+          </a:fillRef>
+          <a:effectRef idx="1">
+            <a:schemeClr val="accent3"/>
+          </a:effectRef>
+          <a:fontRef idx="minor">
+            <a:schemeClr val="dk1"/>
+          </a:fontRef>
+        </p:style>
+        <p:txBody>
+          <a:bodyPr rtlCol="0" anchor="ctr"/>
+          <a:lstStyle/>
+          <a:p>
+            <a:pPr algn="ctr"/>
+            <a:endParaRPr lang="en-SG" sz="1400">
+              <a:solidFill>
+                <a:schemeClr val="dk1"/>
+              </a:solidFill>
+            </a:endParaRPr>
+          </a:p>
+        </p:txBody>
+      </p:sp>
+      <p:sp>
+        <p:nvSpPr>
+          <p:cNvPr id="19" name="Rectangle 62"/>
+          <p:cNvSpPr/>
+          <p:nvPr/>
+        </p:nvSpPr>
+        <p:spPr>
+          <a:xfrm>
+            <a:off x="5410200" y="607926"/>
+            <a:ext cx="1093635" cy="346760"/>
+          </a:xfrm>
+          <a:prstGeom prst="rect">
+            <a:avLst/>
+          </a:prstGeom>
+          <a:solidFill>
+            <a:srgbClr val="7030A0"/>
+          </a:solidFill>
+          <a:ln w="19050">
+            <a:solidFill>
+              <a:srgbClr val="7030A0"/>
+            </a:solidFill>
+          </a:ln>
+          <a:effectLst/>
+        </p:spPr>
+        <p:style>
+          <a:lnRef idx="1">
+            <a:schemeClr val="accent2"/>
+          </a:lnRef>
+          <a:fillRef idx="2">
+            <a:schemeClr val="accent2"/>
+          </a:fillRef>
+          <a:effectRef idx="1">
+            <a:schemeClr val="accent2"/>
+          </a:effectRef>
+          <a:fontRef idx="minor">
+            <a:schemeClr val="dk1"/>
+          </a:fontRef>
+        </p:style>
+        <p:txBody>
+          <a:bodyPr rtlCol="0" anchor="ctr"/>
+          <a:lstStyle/>
+          <a:p>
+            <a:pPr algn="ctr"/>
+            <a:r>
+              <a:rPr lang="en-US" sz="1600" dirty="0">
+                <a:solidFill>
+                  <a:schemeClr val="bg1"/>
+                </a:solidFill>
+              </a:rPr>
+              <a:t>:Model</a:t>
+            </a:r>
+            <a:endParaRPr lang="en-SG" sz="1600" dirty="0">
+              <a:solidFill>
+                <a:schemeClr val="bg1"/>
+              </a:solidFill>
+            </a:endParaRPr>
+          </a:p>
+        </p:txBody>
+      </p:sp>
+      <p:cxnSp>
+        <p:nvCxnSpPr>
+          <p:cNvPr id="20" name="Straight Connector 19"/>
+          <p:cNvCxnSpPr/>
+          <p:nvPr/>
+        </p:nvCxnSpPr>
+        <p:spPr>
+          <a:xfrm>
+            <a:off x="5957017" y="971597"/>
+            <a:ext cx="0" cy="1723059"/>
+          </a:xfrm>
+          <a:prstGeom prst="line">
+            <a:avLst/>
+          </a:prstGeom>
+          <a:ln w="19050">
+            <a:solidFill>
+              <a:srgbClr val="7030A0"/>
+            </a:solidFill>
+            <a:prstDash val="sysDash"/>
+          </a:ln>
+          <a:effectLst/>
+        </p:spPr>
+        <p:style>
+          <a:lnRef idx="1">
+            <a:schemeClr val="accent1"/>
+          </a:lnRef>
+          <a:fillRef idx="2">
+            <a:schemeClr val="accent1"/>
+          </a:fillRef>
+          <a:effectRef idx="1">
+            <a:schemeClr val="accent1"/>
+          </a:effectRef>
+          <a:fontRef idx="minor">
+            <a:schemeClr val="dk1"/>
+          </a:fontRef>
+        </p:style>
+      </p:cxnSp>
+      <p:sp>
+        <p:nvSpPr>
+          <p:cNvPr id="21" name="Rectangle 20"/>
+          <p:cNvSpPr/>
+          <p:nvPr/>
+        </p:nvSpPr>
+        <p:spPr>
+          <a:xfrm>
+            <a:off x="5885009" y="1538408"/>
+            <a:ext cx="142006" cy="651394"/>
+          </a:xfrm>
+          <a:prstGeom prst="rect">
+            <a:avLst/>
+          </a:prstGeom>
+          <a:solidFill>
+            <a:srgbClr val="7030A0"/>
+          </a:solidFill>
+          <a:ln>
+            <a:solidFill>
+              <a:srgbClr val="7030A0"/>
+            </a:solidFill>
+          </a:ln>
+          <a:effectLst/>
+        </p:spPr>
+        <p:style>
+          <a:lnRef idx="1">
+            <a:schemeClr val="accent3"/>
+          </a:lnRef>
+          <a:fillRef idx="2">
+            <a:schemeClr val="accent3"/>
+          </a:fillRef>
+          <a:effectRef idx="1">
+            <a:schemeClr val="accent3"/>
+          </a:effectRef>
+          <a:fontRef idx="minor">
+            <a:schemeClr val="dk1"/>
+          </a:fontRef>
+        </p:style>
+        <p:txBody>
+          <a:bodyPr rtlCol="0" anchor="ctr"/>
+          <a:lstStyle/>
+          <a:p>
+            <a:pPr algn="ctr"/>
+            <a:endParaRPr lang="en-SG" sz="1400">
+              <a:solidFill>
+                <a:schemeClr val="dk1"/>
+              </a:solidFill>
+            </a:endParaRPr>
+          </a:p>
+        </p:txBody>
+      </p:sp>
+      <p:cxnSp>
+        <p:nvCxnSpPr>
+          <p:cNvPr id="23" name="Straight Arrow Connector 22"/>
+          <p:cNvCxnSpPr/>
+          <p:nvPr/>
+        </p:nvCxnSpPr>
+        <p:spPr>
+          <a:xfrm>
+            <a:off x="466818" y="1325979"/>
+            <a:ext cx="1119851" cy="0"/>
+          </a:xfrm>
+          <a:prstGeom prst="straightConnector1">
+            <a:avLst/>
+          </a:prstGeom>
+          <a:ln w="19050">
+            <a:solidFill>
+              <a:schemeClr val="tx1"/>
+            </a:solidFill>
+            <a:tailEnd type="arrow"/>
+          </a:ln>
+        </p:spPr>
+        <p:style>
+          <a:lnRef idx="1">
+            <a:schemeClr val="accent1"/>
+          </a:lnRef>
+          <a:fillRef idx="0">
+            <a:schemeClr val="accent1"/>
+          </a:fillRef>
+          <a:effectRef idx="0">
+            <a:schemeClr val="accent1"/>
+          </a:effectRef>
+          <a:fontRef idx="minor">
+            <a:schemeClr val="tx1"/>
+          </a:fontRef>
+        </p:style>
+      </p:cxnSp>
+      <p:sp>
+        <p:nvSpPr>
+          <p:cNvPr id="24" name="TextBox 23"/>
+          <p:cNvSpPr txBox="1"/>
+          <p:nvPr/>
+        </p:nvSpPr>
+        <p:spPr>
+          <a:xfrm>
+            <a:off x="466818" y="1345880"/>
+            <a:ext cx="1109408" cy="215444"/>
+          </a:xfrm>
+          <a:prstGeom prst="rect">
+            <a:avLst/>
+          </a:prstGeom>
+          <a:noFill/>
+        </p:spPr>
+        <p:txBody>
+          <a:bodyPr wrap="square" lIns="0" tIns="0" rIns="0" bIns="0" rtlCol="0">
+            <a:spAutoFit/>
+          </a:bodyPr>
+          <a:lstStyle/>
+          <a:p>
+            <a:r>
+              <a:rPr lang="en-US" sz="1400" dirty="0"/>
+              <a:t>delete 1</a:t>
+            </a:r>
+          </a:p>
+        </p:txBody>
+      </p:sp>
+      <p:cxnSp>
+        <p:nvCxnSpPr>
+          <p:cNvPr id="25" name="Straight Arrow Connector 24"/>
+          <p:cNvCxnSpPr/>
+          <p:nvPr/>
+        </p:nvCxnSpPr>
+        <p:spPr>
+          <a:xfrm>
+            <a:off x="1739069" y="1433478"/>
+            <a:ext cx="2071323" cy="0"/>
+          </a:xfrm>
+          <a:prstGeom prst="straightConnector1">
+            <a:avLst/>
+          </a:prstGeom>
+          <a:ln w="19050">
+            <a:solidFill>
+              <a:srgbClr val="00B050"/>
+            </a:solidFill>
+            <a:tailEnd type="arrow"/>
+          </a:ln>
+        </p:spPr>
+        <p:style>
+          <a:lnRef idx="1">
+            <a:schemeClr val="accent1"/>
+          </a:lnRef>
+          <a:fillRef idx="0">
+            <a:schemeClr val="accent1"/>
+          </a:fillRef>
+          <a:effectRef idx="0">
+            <a:schemeClr val="accent1"/>
+          </a:effectRef>
+          <a:fontRef idx="minor">
+            <a:schemeClr val="tx1"/>
+          </a:fontRef>
+        </p:style>
+      </p:cxnSp>
+      <p:sp>
+        <p:nvSpPr>
+          <p:cNvPr id="26" name="TextBox 25"/>
+          <p:cNvSpPr txBox="1"/>
+          <p:nvPr/>
+        </p:nvSpPr>
+        <p:spPr>
+          <a:xfrm>
+            <a:off x="2166172" y="1453379"/>
+            <a:ext cx="1424846" cy="215444"/>
+          </a:xfrm>
+          <a:prstGeom prst="rect">
+            <a:avLst/>
+          </a:prstGeom>
+          <a:noFill/>
+        </p:spPr>
+        <p:txBody>
+          <a:bodyPr wrap="square" lIns="0" tIns="0" rIns="0" bIns="0" rtlCol="0">
+            <a:spAutoFit/>
+          </a:bodyPr>
+          <a:lstStyle/>
+          <a:p>
+            <a:r>
+              <a:rPr lang="en-US" sz="1400" dirty="0">
+                <a:solidFill>
+                  <a:srgbClr val="0070C0"/>
+                </a:solidFill>
+              </a:rPr>
+              <a:t>execute(“delete 1”)</a:t>
+            </a:r>
+          </a:p>
+        </p:txBody>
+      </p:sp>
+      <p:cxnSp>
+        <p:nvCxnSpPr>
+          <p:cNvPr id="28" name="Straight Arrow Connector 27"/>
+          <p:cNvCxnSpPr>
+            <a:cxnSpLocks/>
+          </p:cNvCxnSpPr>
+          <p:nvPr/>
+        </p:nvCxnSpPr>
+        <p:spPr>
+          <a:xfrm flipV="1">
+            <a:off x="3954408" y="1538408"/>
+            <a:ext cx="1912992" cy="1"/>
+          </a:xfrm>
+          <a:prstGeom prst="straightConnector1">
+            <a:avLst/>
+          </a:prstGeom>
+          <a:ln w="19050">
+            <a:solidFill>
+              <a:srgbClr val="0070C0"/>
+            </a:solidFill>
+            <a:tailEnd type="arrow"/>
+          </a:ln>
+        </p:spPr>
+        <p:style>
+          <a:lnRef idx="1">
+            <a:schemeClr val="accent1"/>
+          </a:lnRef>
+          <a:fillRef idx="0">
+            <a:schemeClr val="accent1"/>
+          </a:fillRef>
+          <a:effectRef idx="0">
+            <a:schemeClr val="accent1"/>
+          </a:effectRef>
+          <a:fontRef idx="minor">
+            <a:schemeClr val="tx1"/>
+          </a:fontRef>
+        </p:style>
+      </p:cxnSp>
+      <p:sp>
+        <p:nvSpPr>
+          <p:cNvPr id="29" name="TextBox 28"/>
+          <p:cNvSpPr txBox="1"/>
+          <p:nvPr/>
+        </p:nvSpPr>
+        <p:spPr>
+          <a:xfrm>
+            <a:off x="4018121" y="1579934"/>
+            <a:ext cx="1844464" cy="215444"/>
+          </a:xfrm>
+          <a:prstGeom prst="rect">
+            <a:avLst/>
+          </a:prstGeom>
+          <a:noFill/>
+        </p:spPr>
+        <p:txBody>
+          <a:bodyPr wrap="square" lIns="0" tIns="0" rIns="0" bIns="0" rtlCol="0">
+            <a:spAutoFit/>
+          </a:bodyPr>
+          <a:lstStyle/>
+          <a:p>
+            <a:r>
+              <a:rPr lang="en-US" sz="1400" dirty="0" err="1">
+                <a:solidFill>
+                  <a:srgbClr val="7030A0"/>
+                </a:solidFill>
+              </a:rPr>
+              <a:t>deleteStudent</a:t>
+            </a:r>
+            <a:r>
+              <a:rPr lang="en-US" sz="1400">
+                <a:solidFill>
+                  <a:srgbClr val="7030A0"/>
+                </a:solidFill>
+              </a:rPr>
+              <a:t>(s)</a:t>
+            </a:r>
+            <a:endParaRPr lang="en-US" sz="1400" dirty="0">
+              <a:solidFill>
+                <a:srgbClr val="7030A0"/>
+              </a:solidFill>
+            </a:endParaRPr>
+          </a:p>
+        </p:txBody>
+      </p:sp>
+      <p:sp>
+        <p:nvSpPr>
+          <p:cNvPr id="33" name="TextBox 32"/>
+          <p:cNvSpPr txBox="1"/>
+          <p:nvPr/>
+        </p:nvSpPr>
+        <p:spPr>
+          <a:xfrm>
+            <a:off x="6096000" y="1687656"/>
+            <a:ext cx="2509735" cy="215444"/>
+          </a:xfrm>
+          <a:prstGeom prst="rect">
+            <a:avLst/>
+          </a:prstGeom>
+          <a:noFill/>
+        </p:spPr>
+        <p:txBody>
+          <a:bodyPr wrap="square" lIns="0" tIns="0" rIns="0" bIns="0" rtlCol="0">
+            <a:spAutoFit/>
+          </a:bodyPr>
+          <a:lstStyle/>
+          <a:p>
+            <a:r>
+              <a:rPr lang="en-US" sz="1400" dirty="0">
+                <a:solidFill>
+                  <a:schemeClr val="accent5">
+                    <a:lumMod val="75000"/>
+                  </a:schemeClr>
+                </a:solidFill>
+              </a:rPr>
+              <a:t>post(</a:t>
+            </a:r>
+            <a:r>
+              <a:rPr lang="en-US" sz="1400" dirty="0" err="1">
+                <a:solidFill>
+                  <a:schemeClr val="accent5">
+                    <a:lumMod val="75000"/>
+                  </a:schemeClr>
+                </a:solidFill>
+              </a:rPr>
+              <a:t>SuperTaClientChangedEvent</a:t>
+            </a:r>
+            <a:r>
+              <a:rPr lang="en-US" sz="1400" dirty="0">
+                <a:solidFill>
+                  <a:schemeClr val="accent5">
+                    <a:lumMod val="75000"/>
+                  </a:schemeClr>
+                </a:solidFill>
+              </a:rPr>
+              <a:t>)</a:t>
+            </a:r>
+          </a:p>
+        </p:txBody>
+      </p:sp>
+      <p:cxnSp>
+        <p:nvCxnSpPr>
+          <p:cNvPr id="34" name="Straight Arrow Connector 33"/>
+          <p:cNvCxnSpPr>
+            <a:cxnSpLocks/>
+          </p:cNvCxnSpPr>
+          <p:nvPr/>
+        </p:nvCxnSpPr>
+        <p:spPr>
+          <a:xfrm flipV="1">
+            <a:off x="3954408" y="2189802"/>
+            <a:ext cx="1912992" cy="879"/>
+          </a:xfrm>
+          <a:prstGeom prst="straightConnector1">
+            <a:avLst/>
+          </a:prstGeom>
+          <a:ln w="19050">
+            <a:solidFill>
+              <a:srgbClr val="7030A0"/>
+            </a:solidFill>
+            <a:prstDash val="sysDash"/>
+            <a:headEnd type="arrow" w="med" len="med"/>
+            <a:tailEnd type="none" w="med" len="med"/>
+          </a:ln>
+        </p:spPr>
+        <p:style>
+          <a:lnRef idx="1">
+            <a:schemeClr val="accent1"/>
+          </a:lnRef>
+          <a:fillRef idx="0">
+            <a:schemeClr val="accent1"/>
+          </a:fillRef>
+          <a:effectRef idx="0">
+            <a:schemeClr val="accent1"/>
+          </a:effectRef>
+          <a:fontRef idx="minor">
+            <a:schemeClr val="tx1"/>
+          </a:fontRef>
+        </p:style>
+      </p:cxnSp>
+      <p:cxnSp>
+        <p:nvCxnSpPr>
+          <p:cNvPr id="35" name="Straight Arrow Connector 34"/>
+          <p:cNvCxnSpPr/>
+          <p:nvPr/>
+        </p:nvCxnSpPr>
+        <p:spPr>
+          <a:xfrm>
+            <a:off x="1739069" y="2266002"/>
+            <a:ext cx="2058118" cy="0"/>
+          </a:xfrm>
+          <a:prstGeom prst="straightConnector1">
+            <a:avLst/>
+          </a:prstGeom>
+          <a:ln w="19050">
+            <a:solidFill>
+              <a:srgbClr val="0070C0"/>
+            </a:solidFill>
+            <a:prstDash val="sysDash"/>
+            <a:headEnd type="arrow" w="med" len="med"/>
+            <a:tailEnd type="none" w="med" len="med"/>
+          </a:ln>
+        </p:spPr>
+        <p:style>
+          <a:lnRef idx="1">
+            <a:schemeClr val="accent1"/>
+          </a:lnRef>
+          <a:fillRef idx="0">
+            <a:schemeClr val="accent1"/>
+          </a:fillRef>
+          <a:effectRef idx="0">
+            <a:schemeClr val="accent1"/>
+          </a:effectRef>
+          <a:fontRef idx="minor">
+            <a:schemeClr val="tx1"/>
+          </a:fontRef>
+        </p:style>
+      </p:cxnSp>
+      <p:cxnSp>
+        <p:nvCxnSpPr>
+          <p:cNvPr id="37" name="Straight Arrow Connector 36"/>
+          <p:cNvCxnSpPr/>
+          <p:nvPr/>
+        </p:nvCxnSpPr>
+        <p:spPr>
+          <a:xfrm>
+            <a:off x="390618" y="2342202"/>
+            <a:ext cx="1196051" cy="0"/>
+          </a:xfrm>
+          <a:prstGeom prst="straightConnector1">
+            <a:avLst/>
+          </a:prstGeom>
+          <a:ln w="19050">
+            <a:solidFill>
+              <a:srgbClr val="00B050"/>
+            </a:solidFill>
+            <a:prstDash val="sysDash"/>
+            <a:headEnd type="arrow" w="med" len="med"/>
+            <a:tailEnd type="none" w="med" len="med"/>
+          </a:ln>
+        </p:spPr>
+        <p:style>
+          <a:lnRef idx="1">
+            <a:schemeClr val="accent1"/>
+          </a:lnRef>
+          <a:fillRef idx="0">
+            <a:schemeClr val="accent1"/>
+          </a:fillRef>
+          <a:effectRef idx="0">
+            <a:schemeClr val="accent1"/>
+          </a:effectRef>
+          <a:fontRef idx="minor">
+            <a:schemeClr val="tx1"/>
+          </a:fontRef>
+        </p:style>
+      </p:cxnSp>
+      <p:sp>
+        <p:nvSpPr>
+          <p:cNvPr id="39" name="Rectangle 62"/>
+          <p:cNvSpPr/>
+          <p:nvPr/>
+        </p:nvSpPr>
+        <p:spPr>
+          <a:xfrm>
+            <a:off x="7789617" y="591251"/>
+            <a:ext cx="1371600" cy="346760"/>
+          </a:xfrm>
+          <a:prstGeom prst="rect">
+            <a:avLst/>
+          </a:prstGeom>
+          <a:solidFill>
+            <a:schemeClr val="accent5">
+              <a:lumMod val="75000"/>
+            </a:schemeClr>
+          </a:solidFill>
+          <a:ln w="19050">
+            <a:solidFill>
+              <a:schemeClr val="accent5">
+                <a:lumMod val="75000"/>
+              </a:schemeClr>
+            </a:solidFill>
+          </a:ln>
+          <a:effectLst/>
+        </p:spPr>
+        <p:style>
+          <a:lnRef idx="1">
+            <a:schemeClr val="accent2"/>
+          </a:lnRef>
+          <a:fillRef idx="2">
+            <a:schemeClr val="accent2"/>
+          </a:fillRef>
+          <a:effectRef idx="1">
+            <a:schemeClr val="accent2"/>
+          </a:effectRef>
+          <a:fontRef idx="minor">
+            <a:schemeClr val="dk1"/>
+          </a:fontRef>
+        </p:style>
+        <p:txBody>
+          <a:bodyPr rtlCol="0" anchor="ctr"/>
+          <a:lstStyle/>
+          <a:p>
+            <a:pPr algn="ctr"/>
+            <a:r>
+              <a:rPr lang="en-US" sz="1600" dirty="0">
+                <a:solidFill>
+                  <a:schemeClr val="bg1"/>
+                </a:solidFill>
+              </a:rPr>
+              <a:t>:</a:t>
+            </a:r>
+            <a:r>
+              <a:rPr lang="en-US" sz="1600" dirty="0" err="1">
+                <a:solidFill>
+                  <a:schemeClr val="bg1"/>
+                </a:solidFill>
+              </a:rPr>
+              <a:t>EventsCenter</a:t>
+            </a:r>
+            <a:endParaRPr lang="en-SG" sz="1600" dirty="0">
+              <a:solidFill>
+                <a:schemeClr val="bg1"/>
+              </a:solidFill>
+            </a:endParaRPr>
+          </a:p>
+        </p:txBody>
+      </p:sp>
+      <p:cxnSp>
+        <p:nvCxnSpPr>
+          <p:cNvPr id="40" name="Straight Connector 39"/>
+          <p:cNvCxnSpPr/>
+          <p:nvPr/>
+        </p:nvCxnSpPr>
+        <p:spPr>
+          <a:xfrm>
+            <a:off x="8710219" y="944305"/>
+            <a:ext cx="0" cy="1723059"/>
+          </a:xfrm>
+          <a:prstGeom prst="line">
+            <a:avLst/>
+          </a:prstGeom>
+          <a:ln w="19050">
+            <a:solidFill>
+              <a:schemeClr val="accent5">
+                <a:lumMod val="75000"/>
+              </a:schemeClr>
+            </a:solidFill>
+            <a:prstDash val="sysDash"/>
+          </a:ln>
+          <a:effectLst/>
+        </p:spPr>
+        <p:style>
+          <a:lnRef idx="1">
+            <a:schemeClr val="accent1"/>
+          </a:lnRef>
+          <a:fillRef idx="2">
+            <a:schemeClr val="accent1"/>
+          </a:fillRef>
+          <a:effectRef idx="1">
+            <a:schemeClr val="accent1"/>
+          </a:effectRef>
+          <a:fontRef idx="minor">
+            <a:schemeClr val="dk1"/>
+          </a:fontRef>
+        </p:style>
+      </p:cxnSp>
+      <p:sp>
+        <p:nvSpPr>
+          <p:cNvPr id="41" name="Rectangle 40"/>
+          <p:cNvSpPr/>
+          <p:nvPr/>
+        </p:nvSpPr>
+        <p:spPr>
+          <a:xfrm>
+            <a:off x="8638211" y="1961202"/>
+            <a:ext cx="142006" cy="176787"/>
+          </a:xfrm>
+          <a:prstGeom prst="rect">
+            <a:avLst/>
+          </a:prstGeom>
+          <a:solidFill>
+            <a:schemeClr val="accent5">
+              <a:lumMod val="75000"/>
+            </a:schemeClr>
+          </a:solidFill>
+          <a:ln>
+            <a:solidFill>
+              <a:schemeClr val="accent5">
+                <a:lumMod val="75000"/>
+              </a:schemeClr>
+            </a:solidFill>
+          </a:ln>
+          <a:effectLst/>
+        </p:spPr>
+        <p:style>
+          <a:lnRef idx="1">
+            <a:schemeClr val="accent3"/>
+          </a:lnRef>
+          <a:fillRef idx="2">
+            <a:schemeClr val="accent3"/>
+          </a:fillRef>
+          <a:effectRef idx="1">
+            <a:schemeClr val="accent3"/>
+          </a:effectRef>
+          <a:fontRef idx="minor">
+            <a:schemeClr val="dk1"/>
+          </a:fontRef>
+        </p:style>
+        <p:txBody>
+          <a:bodyPr rtlCol="0" anchor="ctr"/>
+          <a:lstStyle/>
+          <a:p>
+            <a:pPr algn="ctr"/>
+            <a:endParaRPr lang="en-SG" sz="1400">
+              <a:solidFill>
+                <a:schemeClr val="dk1"/>
+              </a:solidFill>
+            </a:endParaRPr>
+          </a:p>
+        </p:txBody>
+      </p:sp>
+      <p:cxnSp>
+        <p:nvCxnSpPr>
+          <p:cNvPr id="42" name="Straight Arrow Connector 41"/>
+          <p:cNvCxnSpPr/>
+          <p:nvPr/>
+        </p:nvCxnSpPr>
+        <p:spPr>
+          <a:xfrm>
+            <a:off x="6037409" y="1961202"/>
+            <a:ext cx="2568438" cy="0"/>
+          </a:xfrm>
+          <a:prstGeom prst="straightConnector1">
+            <a:avLst/>
+          </a:prstGeom>
+          <a:ln w="19050">
+            <a:solidFill>
+              <a:srgbClr val="7030A0"/>
+            </a:solidFill>
+            <a:tailEnd type="arrow"/>
+          </a:ln>
+        </p:spPr>
+        <p:style>
+          <a:lnRef idx="1">
+            <a:schemeClr val="accent1"/>
+          </a:lnRef>
+          <a:fillRef idx="0">
+            <a:schemeClr val="accent1"/>
+          </a:fillRef>
+          <a:effectRef idx="0">
+            <a:schemeClr val="accent1"/>
+          </a:effectRef>
+          <a:fontRef idx="minor">
+            <a:schemeClr val="tx1"/>
+          </a:fontRef>
+        </p:style>
+      </p:cxnSp>
+      <p:cxnSp>
+        <p:nvCxnSpPr>
+          <p:cNvPr id="44" name="Straight Arrow Connector 43"/>
+          <p:cNvCxnSpPr/>
+          <p:nvPr/>
+        </p:nvCxnSpPr>
+        <p:spPr>
+          <a:xfrm>
+            <a:off x="6037409" y="2137989"/>
+            <a:ext cx="2549946" cy="0"/>
+          </a:xfrm>
+          <a:prstGeom prst="straightConnector1">
+            <a:avLst/>
+          </a:prstGeom>
+          <a:ln w="19050">
+            <a:solidFill>
+              <a:schemeClr val="accent5">
+                <a:lumMod val="75000"/>
+              </a:schemeClr>
+            </a:solidFill>
+            <a:prstDash val="sysDash"/>
+            <a:headEnd type="arrow" w="med" len="med"/>
+            <a:tailEnd type="none" w="med" len="med"/>
+          </a:ln>
+        </p:spPr>
+        <p:style>
+          <a:lnRef idx="1">
+            <a:schemeClr val="accent1"/>
+          </a:lnRef>
+          <a:fillRef idx="0">
+            <a:schemeClr val="accent1"/>
+          </a:fillRef>
+          <a:effectRef idx="0">
+            <a:schemeClr val="accent1"/>
+          </a:effectRef>
+          <a:fontRef idx="minor">
+            <a:schemeClr val="tx1"/>
+          </a:fontRef>
+        </p:style>
+      </p:cxnSp>
+      <p:sp>
+        <p:nvSpPr>
+          <p:cNvPr id="53" name="Rectangle 62"/>
+          <p:cNvSpPr/>
+          <p:nvPr/>
+        </p:nvSpPr>
+        <p:spPr>
+          <a:xfrm>
+            <a:off x="7370178" y="4278322"/>
+            <a:ext cx="1093635" cy="346760"/>
+          </a:xfrm>
+          <a:prstGeom prst="rect">
+            <a:avLst/>
+          </a:prstGeom>
+          <a:solidFill>
+            <a:schemeClr val="accent6">
+              <a:lumMod val="75000"/>
+            </a:schemeClr>
+          </a:solidFill>
+          <a:ln w="19050">
+            <a:solidFill>
+              <a:schemeClr val="accent6">
+                <a:lumMod val="75000"/>
+              </a:schemeClr>
+            </a:solidFill>
+          </a:ln>
+          <a:effectLst/>
+        </p:spPr>
+        <p:style>
+          <a:lnRef idx="1">
+            <a:schemeClr val="accent2"/>
+          </a:lnRef>
+          <a:fillRef idx="2">
+            <a:schemeClr val="accent2"/>
+          </a:fillRef>
+          <a:effectRef idx="1">
+            <a:schemeClr val="accent2"/>
+          </a:effectRef>
+          <a:fontRef idx="minor">
+            <a:schemeClr val="dk1"/>
+          </a:fontRef>
+        </p:style>
+        <p:txBody>
+          <a:bodyPr rtlCol="0" anchor="ctr"/>
+          <a:lstStyle/>
+          <a:p>
+            <a:pPr algn="ctr"/>
+            <a:r>
+              <a:rPr lang="en-US" sz="1600" dirty="0">
+                <a:solidFill>
+                  <a:schemeClr val="bg1"/>
+                </a:solidFill>
+              </a:rPr>
+              <a:t>:Storage</a:t>
+            </a:r>
+            <a:endParaRPr lang="en-SG" sz="1600" dirty="0">
+              <a:solidFill>
+                <a:schemeClr val="bg1"/>
+              </a:solidFill>
+            </a:endParaRPr>
+          </a:p>
+        </p:txBody>
+      </p:sp>
+      <p:cxnSp>
+        <p:nvCxnSpPr>
+          <p:cNvPr id="54" name="Straight Connector 53"/>
+          <p:cNvCxnSpPr/>
+          <p:nvPr/>
+        </p:nvCxnSpPr>
+        <p:spPr>
+          <a:xfrm>
+            <a:off x="7916995" y="4641993"/>
+            <a:ext cx="0" cy="1723059"/>
+          </a:xfrm>
+          <a:prstGeom prst="line">
+            <a:avLst/>
+          </a:prstGeom>
+          <a:ln w="19050">
+            <a:solidFill>
+              <a:schemeClr val="accent6">
+                <a:lumMod val="75000"/>
+              </a:schemeClr>
+            </a:solidFill>
+            <a:prstDash val="sysDash"/>
+          </a:ln>
+          <a:effectLst/>
+        </p:spPr>
+        <p:style>
+          <a:lnRef idx="1">
+            <a:schemeClr val="accent1"/>
+          </a:lnRef>
+          <a:fillRef idx="2">
+            <a:schemeClr val="accent1"/>
+          </a:fillRef>
+          <a:effectRef idx="1">
+            <a:schemeClr val="accent1"/>
+          </a:effectRef>
+          <a:fontRef idx="minor">
+            <a:schemeClr val="dk1"/>
+          </a:fontRef>
+        </p:style>
+      </p:cxnSp>
+      <p:sp>
+        <p:nvSpPr>
+          <p:cNvPr id="55" name="Rectangle 54"/>
+          <p:cNvSpPr/>
+          <p:nvPr/>
+        </p:nvSpPr>
+        <p:spPr>
+          <a:xfrm>
+            <a:off x="7844987" y="5335662"/>
+            <a:ext cx="124478" cy="287409"/>
+          </a:xfrm>
+          <a:prstGeom prst="rect">
+            <a:avLst/>
+          </a:prstGeom>
+          <a:solidFill>
+            <a:schemeClr val="accent6">
+              <a:lumMod val="75000"/>
+            </a:schemeClr>
+          </a:solidFill>
+          <a:ln>
+            <a:solidFill>
+              <a:schemeClr val="accent6">
+                <a:lumMod val="75000"/>
+              </a:schemeClr>
+            </a:solidFill>
+          </a:ln>
+          <a:effectLst/>
+        </p:spPr>
+        <p:style>
+          <a:lnRef idx="1">
+            <a:schemeClr val="accent3"/>
+          </a:lnRef>
+          <a:fillRef idx="2">
+            <a:schemeClr val="accent3"/>
+          </a:fillRef>
+          <a:effectRef idx="1">
+            <a:schemeClr val="accent3"/>
+          </a:effectRef>
+          <a:fontRef idx="minor">
+            <a:schemeClr val="dk1"/>
+          </a:fontRef>
+        </p:style>
+        <p:txBody>
+          <a:bodyPr rtlCol="0" anchor="ctr"/>
+          <a:lstStyle/>
+          <a:p>
+            <a:pPr algn="ctr"/>
+            <a:endParaRPr lang="en-SG" sz="1400">
+              <a:solidFill>
+                <a:schemeClr val="dk1"/>
+              </a:solidFill>
+            </a:endParaRPr>
+          </a:p>
+        </p:txBody>
+      </p:sp>
+      <p:sp>
+        <p:nvSpPr>
+          <p:cNvPr id="62" name="TextBox 61"/>
+          <p:cNvSpPr txBox="1"/>
+          <p:nvPr/>
+        </p:nvSpPr>
+        <p:spPr>
+          <a:xfrm>
+            <a:off x="1810094" y="4797674"/>
+            <a:ext cx="2716635" cy="215444"/>
+          </a:xfrm>
+          <a:prstGeom prst="rect">
+            <a:avLst/>
+          </a:prstGeom>
+          <a:noFill/>
+        </p:spPr>
+        <p:txBody>
+          <a:bodyPr wrap="square" lIns="0" tIns="0" rIns="0" bIns="0" rtlCol="0">
+            <a:spAutoFit/>
+          </a:bodyPr>
+          <a:lstStyle/>
+          <a:p>
+            <a:r>
+              <a:rPr lang="en-US" sz="1400" dirty="0">
+                <a:solidFill>
+                  <a:schemeClr val="accent5">
+                    <a:lumMod val="75000"/>
+                  </a:schemeClr>
+                </a:solidFill>
+              </a:rPr>
+              <a:t>post(</a:t>
+            </a:r>
+            <a:r>
+              <a:rPr lang="en-US" sz="1400" dirty="0" err="1">
+                <a:solidFill>
+                  <a:schemeClr val="accent5">
+                    <a:lumMod val="75000"/>
+                  </a:schemeClr>
+                </a:solidFill>
+              </a:rPr>
+              <a:t>SuperTaClientChangedEvent</a:t>
+            </a:r>
+            <a:r>
+              <a:rPr lang="en-US" sz="1400" dirty="0">
+                <a:solidFill>
+                  <a:schemeClr val="accent5">
+                    <a:lumMod val="75000"/>
+                  </a:schemeClr>
+                </a:solidFill>
+              </a:rPr>
+              <a:t>)</a:t>
+            </a:r>
+          </a:p>
+        </p:txBody>
+      </p:sp>
+      <p:cxnSp>
+        <p:nvCxnSpPr>
+          <p:cNvPr id="63" name="Straight Arrow Connector 62"/>
+          <p:cNvCxnSpPr/>
+          <p:nvPr/>
+        </p:nvCxnSpPr>
+        <p:spPr>
+          <a:xfrm flipH="1">
+            <a:off x="4526729" y="5623071"/>
+            <a:ext cx="3383941" cy="0"/>
+          </a:xfrm>
+          <a:prstGeom prst="straightConnector1">
+            <a:avLst/>
+          </a:prstGeom>
+          <a:ln w="19050">
+            <a:solidFill>
+              <a:schemeClr val="accent6">
+                <a:lumMod val="75000"/>
+              </a:schemeClr>
+            </a:solidFill>
+            <a:prstDash val="sysDash"/>
+            <a:headEnd type="none" w="med" len="med"/>
+            <a:tailEnd type="arrow" w="med" len="med"/>
+          </a:ln>
+        </p:spPr>
+        <p:style>
+          <a:lnRef idx="1">
+            <a:schemeClr val="accent1"/>
+          </a:lnRef>
+          <a:fillRef idx="0">
+            <a:schemeClr val="accent1"/>
+          </a:fillRef>
+          <a:effectRef idx="0">
+            <a:schemeClr val="accent1"/>
+          </a:effectRef>
+          <a:fontRef idx="minor">
+            <a:schemeClr val="tx1"/>
+          </a:fontRef>
+        </p:style>
+      </p:cxnSp>
+      <p:sp>
+        <p:nvSpPr>
+          <p:cNvPr id="66" name="Rectangle 62"/>
+          <p:cNvSpPr/>
+          <p:nvPr/>
+        </p:nvSpPr>
+        <p:spPr>
+          <a:xfrm>
+            <a:off x="3791146" y="4295233"/>
+            <a:ext cx="1371600" cy="346760"/>
+          </a:xfrm>
+          <a:prstGeom prst="rect">
+            <a:avLst/>
+          </a:prstGeom>
+          <a:solidFill>
+            <a:schemeClr val="accent5">
+              <a:lumMod val="75000"/>
+            </a:schemeClr>
+          </a:solidFill>
+          <a:ln w="19050">
+            <a:solidFill>
+              <a:schemeClr val="accent5">
+                <a:lumMod val="75000"/>
+              </a:schemeClr>
+            </a:solidFill>
+          </a:ln>
+          <a:effectLst/>
+        </p:spPr>
+        <p:style>
+          <a:lnRef idx="1">
+            <a:schemeClr val="accent2"/>
+          </a:lnRef>
+          <a:fillRef idx="2">
+            <a:schemeClr val="accent2"/>
+          </a:fillRef>
+          <a:effectRef idx="1">
+            <a:schemeClr val="accent2"/>
+          </a:effectRef>
+          <a:fontRef idx="minor">
+            <a:schemeClr val="dk1"/>
+          </a:fontRef>
+        </p:style>
+        <p:txBody>
+          <a:bodyPr rtlCol="0" anchor="ctr"/>
+          <a:lstStyle/>
+          <a:p>
+            <a:pPr algn="ctr"/>
+            <a:r>
+              <a:rPr lang="en-US" sz="1600" dirty="0">
+                <a:solidFill>
+                  <a:schemeClr val="bg1"/>
+                </a:solidFill>
+              </a:rPr>
+              <a:t>:</a:t>
+            </a:r>
+            <a:r>
+              <a:rPr lang="en-US" sz="1600" dirty="0" err="1">
+                <a:solidFill>
+                  <a:schemeClr val="bg1"/>
+                </a:solidFill>
+              </a:rPr>
+              <a:t>EventsCenter</a:t>
+            </a:r>
+            <a:endParaRPr lang="en-SG" sz="1600" dirty="0">
+              <a:solidFill>
+                <a:schemeClr val="bg1"/>
+              </a:solidFill>
+            </a:endParaRPr>
+          </a:p>
+        </p:txBody>
+      </p:sp>
+      <p:cxnSp>
+        <p:nvCxnSpPr>
+          <p:cNvPr id="67" name="Straight Connector 66"/>
+          <p:cNvCxnSpPr/>
+          <p:nvPr/>
+        </p:nvCxnSpPr>
+        <p:spPr>
+          <a:xfrm>
+            <a:off x="4456731" y="4648287"/>
+            <a:ext cx="0" cy="1723059"/>
+          </a:xfrm>
+          <a:prstGeom prst="line">
+            <a:avLst/>
+          </a:prstGeom>
+          <a:ln w="19050">
+            <a:solidFill>
+              <a:schemeClr val="accent5">
+                <a:lumMod val="75000"/>
+              </a:schemeClr>
+            </a:solidFill>
+            <a:prstDash val="sysDash"/>
+          </a:ln>
+          <a:effectLst/>
+        </p:spPr>
+        <p:style>
+          <a:lnRef idx="1">
+            <a:schemeClr val="accent1"/>
+          </a:lnRef>
+          <a:fillRef idx="2">
+            <a:schemeClr val="accent1"/>
+          </a:fillRef>
+          <a:effectRef idx="1">
+            <a:schemeClr val="accent1"/>
+          </a:effectRef>
+          <a:fontRef idx="minor">
+            <a:schemeClr val="dk1"/>
+          </a:fontRef>
+        </p:style>
+      </p:cxnSp>
+      <p:sp>
+        <p:nvSpPr>
+          <p:cNvPr id="68" name="Rectangle 67"/>
+          <p:cNvSpPr/>
+          <p:nvPr/>
+        </p:nvSpPr>
+        <p:spPr>
+          <a:xfrm>
+            <a:off x="4384723" y="5071220"/>
+            <a:ext cx="142006" cy="1036757"/>
+          </a:xfrm>
+          <a:prstGeom prst="rect">
+            <a:avLst/>
+          </a:prstGeom>
+          <a:solidFill>
+            <a:schemeClr val="accent5">
+              <a:lumMod val="75000"/>
+            </a:schemeClr>
+          </a:solidFill>
+          <a:ln>
+            <a:solidFill>
+              <a:schemeClr val="accent5">
+                <a:lumMod val="75000"/>
+              </a:schemeClr>
+            </a:solidFill>
+          </a:ln>
+          <a:effectLst/>
+        </p:spPr>
+        <p:style>
+          <a:lnRef idx="1">
+            <a:schemeClr val="accent3"/>
+          </a:lnRef>
+          <a:fillRef idx="2">
+            <a:schemeClr val="accent3"/>
+          </a:fillRef>
+          <a:effectRef idx="1">
+            <a:schemeClr val="accent3"/>
+          </a:effectRef>
+          <a:fontRef idx="minor">
+            <a:schemeClr val="dk1"/>
+          </a:fontRef>
+        </p:style>
+        <p:txBody>
+          <a:bodyPr rtlCol="0" anchor="ctr"/>
+          <a:lstStyle/>
+          <a:p>
+            <a:pPr algn="ctr"/>
+            <a:endParaRPr lang="en-SG" sz="1400">
+              <a:solidFill>
+                <a:schemeClr val="dk1"/>
+              </a:solidFill>
+            </a:endParaRPr>
+          </a:p>
+        </p:txBody>
+      </p:sp>
+      <p:cxnSp>
+        <p:nvCxnSpPr>
+          <p:cNvPr id="69" name="Straight Arrow Connector 68"/>
+          <p:cNvCxnSpPr/>
+          <p:nvPr/>
+        </p:nvCxnSpPr>
+        <p:spPr>
+          <a:xfrm>
+            <a:off x="3078929" y="5071220"/>
+            <a:ext cx="1295400" cy="0"/>
+          </a:xfrm>
+          <a:prstGeom prst="straightConnector1">
+            <a:avLst/>
+          </a:prstGeom>
+          <a:ln w="19050">
+            <a:solidFill>
+              <a:srgbClr val="7030A0"/>
+            </a:solidFill>
+            <a:tailEnd type="arrow"/>
+          </a:ln>
+        </p:spPr>
+        <p:style>
+          <a:lnRef idx="1">
+            <a:schemeClr val="accent1"/>
+          </a:lnRef>
+          <a:fillRef idx="0">
+            <a:schemeClr val="accent1"/>
+          </a:fillRef>
+          <a:effectRef idx="0">
+            <a:schemeClr val="accent1"/>
+          </a:effectRef>
+          <a:fontRef idx="minor">
+            <a:schemeClr val="tx1"/>
+          </a:fontRef>
+        </p:style>
+      </p:cxnSp>
+      <p:cxnSp>
+        <p:nvCxnSpPr>
+          <p:cNvPr id="70" name="Straight Arrow Connector 69"/>
+          <p:cNvCxnSpPr/>
+          <p:nvPr/>
+        </p:nvCxnSpPr>
+        <p:spPr>
+          <a:xfrm>
+            <a:off x="2975642" y="6107977"/>
+            <a:ext cx="1448755" cy="0"/>
+          </a:xfrm>
+          <a:prstGeom prst="straightConnector1">
+            <a:avLst/>
+          </a:prstGeom>
+          <a:ln w="19050">
+            <a:solidFill>
+              <a:schemeClr val="accent5">
+                <a:lumMod val="75000"/>
+              </a:schemeClr>
+            </a:solidFill>
+            <a:prstDash val="sysDash"/>
+            <a:headEnd type="arrow" w="med" len="med"/>
+            <a:tailEnd type="none" w="med" len="med"/>
+          </a:ln>
+        </p:spPr>
+        <p:style>
+          <a:lnRef idx="1">
+            <a:schemeClr val="accent1"/>
+          </a:lnRef>
+          <a:fillRef idx="0">
+            <a:schemeClr val="accent1"/>
+          </a:fillRef>
+          <a:effectRef idx="0">
+            <a:schemeClr val="accent1"/>
+          </a:effectRef>
+          <a:fontRef idx="minor">
+            <a:schemeClr val="tx1"/>
+          </a:fontRef>
+        </p:style>
+      </p:cxnSp>
+      <p:cxnSp>
+        <p:nvCxnSpPr>
+          <p:cNvPr id="72" name="Straight Arrow Connector 71"/>
+          <p:cNvCxnSpPr/>
+          <p:nvPr/>
+        </p:nvCxnSpPr>
+        <p:spPr>
+          <a:xfrm>
+            <a:off x="4526729" y="5341014"/>
+            <a:ext cx="3318258" cy="0"/>
+          </a:xfrm>
+          <a:prstGeom prst="straightConnector1">
+            <a:avLst/>
+          </a:prstGeom>
+          <a:ln w="19050">
+            <a:solidFill>
+              <a:schemeClr val="accent5">
+                <a:lumMod val="75000"/>
+              </a:schemeClr>
+            </a:solidFill>
+            <a:headEnd type="none" w="med" len="med"/>
+            <a:tailEnd type="arrow" w="med" len="med"/>
+          </a:ln>
+        </p:spPr>
+        <p:style>
+          <a:lnRef idx="1">
+            <a:schemeClr val="accent1"/>
+          </a:lnRef>
+          <a:fillRef idx="0">
+            <a:schemeClr val="accent1"/>
+          </a:fillRef>
+          <a:effectRef idx="0">
+            <a:schemeClr val="accent1"/>
+          </a:effectRef>
+          <a:fontRef idx="minor">
+            <a:schemeClr val="tx1"/>
+          </a:fontRef>
+        </p:style>
+      </p:cxnSp>
+      <p:sp>
+        <p:nvSpPr>
+          <p:cNvPr id="74" name="TextBox 73"/>
+          <p:cNvSpPr txBox="1"/>
+          <p:nvPr/>
+        </p:nvSpPr>
+        <p:spPr>
+          <a:xfrm>
+            <a:off x="5036330" y="5065911"/>
+            <a:ext cx="2659870" cy="215444"/>
+          </a:xfrm>
+          <a:prstGeom prst="rect">
+            <a:avLst/>
+          </a:prstGeom>
+          <a:noFill/>
+        </p:spPr>
+        <p:txBody>
+          <a:bodyPr wrap="square" lIns="0" tIns="0" rIns="0" bIns="0" rtlCol="0">
+            <a:spAutoFit/>
+          </a:bodyPr>
+          <a:lstStyle/>
+          <a:p>
+            <a:r>
+              <a:rPr lang="en-US" sz="1400" dirty="0" err="1">
+                <a:solidFill>
+                  <a:schemeClr val="accent6">
+                    <a:lumMod val="75000"/>
+                  </a:schemeClr>
+                </a:solidFill>
+              </a:rPr>
+              <a:t>handleSuperTaClientChangedEvent</a:t>
+            </a:r>
+            <a:r>
+              <a:rPr lang="en-US" sz="1400" dirty="0">
+                <a:solidFill>
+                  <a:schemeClr val="accent6">
+                    <a:lumMod val="75000"/>
+                  </a:schemeClr>
+                </a:solidFill>
+              </a:rPr>
+              <a:t>()</a:t>
+            </a:r>
+          </a:p>
+        </p:txBody>
+      </p:sp>
+      <p:cxnSp>
+        <p:nvCxnSpPr>
+          <p:cNvPr id="85" name="Straight Connector 84"/>
+          <p:cNvCxnSpPr/>
+          <p:nvPr/>
+        </p:nvCxnSpPr>
+        <p:spPr>
+          <a:xfrm flipH="1">
+            <a:off x="314394" y="1099672"/>
+            <a:ext cx="24" cy="1598671"/>
+          </a:xfrm>
+          <a:prstGeom prst="line">
+            <a:avLst/>
+          </a:prstGeom>
+          <a:ln w="19050">
+            <a:solidFill>
+              <a:schemeClr val="tx1"/>
+            </a:solidFill>
+            <a:prstDash val="sysDash"/>
+          </a:ln>
+          <a:effectLst/>
+        </p:spPr>
+        <p:style>
+          <a:lnRef idx="1">
+            <a:schemeClr val="accent1"/>
+          </a:lnRef>
+          <a:fillRef idx="2">
+            <a:schemeClr val="accent1"/>
+          </a:fillRef>
+          <a:effectRef idx="1">
+            <a:schemeClr val="accent1"/>
+          </a:effectRef>
+          <a:fontRef idx="minor">
+            <a:schemeClr val="dk1"/>
+          </a:fontRef>
+        </p:style>
+      </p:cxnSp>
+      <p:sp>
+        <p:nvSpPr>
+          <p:cNvPr id="45" name="Rectangle 62"/>
+          <p:cNvSpPr/>
+          <p:nvPr/>
+        </p:nvSpPr>
+        <p:spPr>
+          <a:xfrm>
+            <a:off x="721634" y="4278322"/>
+            <a:ext cx="1093635" cy="346760"/>
+          </a:xfrm>
+          <a:prstGeom prst="rect">
+            <a:avLst/>
+          </a:prstGeom>
+          <a:solidFill>
+            <a:srgbClr val="00B050"/>
+          </a:solidFill>
+          <a:ln w="19050">
+            <a:solidFill>
+              <a:srgbClr val="00B050"/>
+            </a:solidFill>
+          </a:ln>
+          <a:effectLst/>
+        </p:spPr>
+        <p:style>
+          <a:lnRef idx="1">
+            <a:schemeClr val="accent2"/>
+          </a:lnRef>
+          <a:fillRef idx="2">
+            <a:schemeClr val="accent2"/>
+          </a:fillRef>
+          <a:effectRef idx="1">
+            <a:schemeClr val="accent2"/>
+          </a:effectRef>
+          <a:fontRef idx="minor">
+            <a:schemeClr val="dk1"/>
+          </a:fontRef>
+        </p:style>
+        <p:txBody>
+          <a:bodyPr rtlCol="0" anchor="ctr"/>
+          <a:lstStyle/>
+          <a:p>
+            <a:pPr algn="ctr"/>
+            <a:r>
+              <a:rPr lang="en-US" sz="1600" dirty="0">
+                <a:solidFill>
+                  <a:schemeClr val="bg1"/>
+                </a:solidFill>
+              </a:rPr>
+              <a:t>:UI</a:t>
+            </a:r>
+            <a:endParaRPr lang="en-SG" sz="1600" dirty="0">
+              <a:solidFill>
+                <a:schemeClr val="bg1"/>
+              </a:solidFill>
+            </a:endParaRPr>
+          </a:p>
+        </p:txBody>
+      </p:sp>
+      <p:cxnSp>
+        <p:nvCxnSpPr>
+          <p:cNvPr id="46" name="Straight Connector 45"/>
+          <p:cNvCxnSpPr/>
+          <p:nvPr/>
+        </p:nvCxnSpPr>
+        <p:spPr>
+          <a:xfrm>
+            <a:off x="1268451" y="4641993"/>
+            <a:ext cx="0" cy="1723059"/>
+          </a:xfrm>
+          <a:prstGeom prst="line">
+            <a:avLst/>
+          </a:prstGeom>
+          <a:ln w="19050">
+            <a:solidFill>
+              <a:srgbClr val="00B050"/>
+            </a:solidFill>
+            <a:prstDash val="sysDash"/>
+          </a:ln>
+          <a:effectLst/>
+        </p:spPr>
+        <p:style>
+          <a:lnRef idx="1">
+            <a:schemeClr val="accent1"/>
+          </a:lnRef>
+          <a:fillRef idx="2">
+            <a:schemeClr val="accent1"/>
+          </a:fillRef>
+          <a:effectRef idx="1">
+            <a:schemeClr val="accent1"/>
+          </a:effectRef>
+          <a:fontRef idx="minor">
+            <a:schemeClr val="dk1"/>
+          </a:fontRef>
+        </p:style>
+      </p:cxnSp>
+      <p:sp>
+        <p:nvSpPr>
+          <p:cNvPr id="47" name="Rectangle 46"/>
+          <p:cNvSpPr/>
+          <p:nvPr/>
+        </p:nvSpPr>
+        <p:spPr>
+          <a:xfrm>
+            <a:off x="1196443" y="5670472"/>
+            <a:ext cx="130545" cy="273128"/>
+          </a:xfrm>
+          <a:prstGeom prst="rect">
+            <a:avLst/>
+          </a:prstGeom>
+          <a:solidFill>
+            <a:srgbClr val="00B050"/>
+          </a:solidFill>
+          <a:ln>
+            <a:solidFill>
+              <a:srgbClr val="00B050"/>
+            </a:solidFill>
+          </a:ln>
+          <a:effectLst/>
+        </p:spPr>
+        <p:style>
+          <a:lnRef idx="1">
+            <a:schemeClr val="accent3"/>
+          </a:lnRef>
+          <a:fillRef idx="2">
+            <a:schemeClr val="accent3"/>
+          </a:fillRef>
+          <a:effectRef idx="1">
+            <a:schemeClr val="accent3"/>
+          </a:effectRef>
+          <a:fontRef idx="minor">
+            <a:schemeClr val="dk1"/>
+          </a:fontRef>
+        </p:style>
+        <p:txBody>
+          <a:bodyPr rtlCol="0" anchor="ctr"/>
+          <a:lstStyle/>
+          <a:p>
+            <a:pPr algn="ctr"/>
+            <a:endParaRPr lang="en-SG" sz="1400">
+              <a:solidFill>
+                <a:schemeClr val="dk1"/>
+              </a:solidFill>
+            </a:endParaRPr>
+          </a:p>
+        </p:txBody>
+      </p:sp>
+      <p:cxnSp>
+        <p:nvCxnSpPr>
+          <p:cNvPr id="48" name="Straight Arrow Connector 47"/>
+          <p:cNvCxnSpPr/>
+          <p:nvPr/>
+        </p:nvCxnSpPr>
+        <p:spPr>
+          <a:xfrm flipH="1">
+            <a:off x="1348843" y="5943600"/>
+            <a:ext cx="3061842" cy="0"/>
+          </a:xfrm>
+          <a:prstGeom prst="straightConnector1">
+            <a:avLst/>
+          </a:prstGeom>
+          <a:ln w="19050">
+            <a:solidFill>
+              <a:srgbClr val="00B050"/>
+            </a:solidFill>
+            <a:prstDash val="sysDash"/>
+            <a:headEnd type="arrow" w="med" len="med"/>
+            <a:tailEnd type="none" w="med" len="med"/>
+          </a:ln>
+        </p:spPr>
+        <p:style>
+          <a:lnRef idx="1">
+            <a:schemeClr val="accent1"/>
+          </a:lnRef>
+          <a:fillRef idx="0">
+            <a:schemeClr val="accent1"/>
+          </a:fillRef>
+          <a:effectRef idx="0">
+            <a:schemeClr val="accent1"/>
+          </a:effectRef>
+          <a:fontRef idx="minor">
+            <a:schemeClr val="tx1"/>
+          </a:fontRef>
+        </p:style>
+      </p:cxnSp>
+      <p:cxnSp>
+        <p:nvCxnSpPr>
+          <p:cNvPr id="49" name="Straight Arrow Connector 48"/>
+          <p:cNvCxnSpPr/>
+          <p:nvPr/>
+        </p:nvCxnSpPr>
+        <p:spPr>
+          <a:xfrm>
+            <a:off x="1348843" y="5670472"/>
+            <a:ext cx="3061841" cy="0"/>
+          </a:xfrm>
+          <a:prstGeom prst="straightConnector1">
+            <a:avLst/>
+          </a:prstGeom>
+          <a:ln w="19050">
+            <a:solidFill>
+              <a:schemeClr val="accent5">
+                <a:lumMod val="75000"/>
+              </a:schemeClr>
+            </a:solidFill>
+            <a:headEnd type="arrow" w="med" len="med"/>
+            <a:tailEnd type="none" w="med" len="med"/>
+          </a:ln>
+        </p:spPr>
+        <p:style>
+          <a:lnRef idx="1">
+            <a:schemeClr val="accent1"/>
+          </a:lnRef>
+          <a:fillRef idx="0">
+            <a:schemeClr val="accent1"/>
+          </a:fillRef>
+          <a:effectRef idx="0">
+            <a:schemeClr val="accent1"/>
+          </a:effectRef>
+          <a:fontRef idx="minor">
+            <a:schemeClr val="tx1"/>
+          </a:fontRef>
+        </p:style>
+      </p:cxnSp>
+      <p:sp>
+        <p:nvSpPr>
+          <p:cNvPr id="50" name="TextBox 49"/>
+          <p:cNvSpPr txBox="1"/>
+          <p:nvPr/>
+        </p:nvSpPr>
+        <p:spPr>
+          <a:xfrm>
+            <a:off x="1416276" y="5395369"/>
+            <a:ext cx="2659870" cy="215444"/>
+          </a:xfrm>
+          <a:prstGeom prst="rect">
+            <a:avLst/>
+          </a:prstGeom>
+          <a:noFill/>
+        </p:spPr>
+        <p:txBody>
+          <a:bodyPr wrap="square" lIns="0" tIns="0" rIns="0" bIns="0" rtlCol="0">
+            <a:spAutoFit/>
+          </a:bodyPr>
+          <a:lstStyle/>
+          <a:p>
+            <a:r>
+              <a:rPr lang="en-US" sz="1400" dirty="0" err="1">
+                <a:solidFill>
+                  <a:srgbClr val="00B050"/>
+                </a:solidFill>
+              </a:rPr>
+              <a:t>handleSuperTaClientChangedEvent</a:t>
+            </a:r>
+            <a:r>
+              <a:rPr lang="en-US" sz="1400" dirty="0">
+                <a:solidFill>
+                  <a:srgbClr val="00B050"/>
+                </a:solidFill>
+              </a:rPr>
+              <a:t>()</a:t>
+            </a:r>
+          </a:p>
+        </p:txBody>
+      </p:sp>
+      <p:grpSp>
+        <p:nvGrpSpPr>
+          <p:cNvPr id="13" name="Group 12"/>
+          <p:cNvGrpSpPr/>
+          <p:nvPr/>
+        </p:nvGrpSpPr>
+        <p:grpSpPr>
+          <a:xfrm>
+            <a:off x="1028134" y="5612032"/>
+            <a:ext cx="217349" cy="270072"/>
+            <a:chOff x="1028134" y="5612032"/>
+            <a:chExt cx="217349" cy="270072"/>
+          </a:xfrm>
+        </p:grpSpPr>
+        <p:sp>
+          <p:nvSpPr>
+            <p:cNvPr id="12" name="Freeform 11"/>
+            <p:cNvSpPr/>
+            <p:nvPr/>
+          </p:nvSpPr>
+          <p:spPr>
+            <a:xfrm rot="2600998" flipH="1" flipV="1">
+              <a:off x="1028134" y="5612032"/>
+              <a:ext cx="167452" cy="116880"/>
+            </a:xfrm>
+            <a:custGeom>
+              <a:avLst/>
+              <a:gdLst>
+                <a:gd name="connsiteX0" fmla="*/ 0 w 226400"/>
+                <a:gd name="connsiteY0" fmla="*/ 32920 h 171466"/>
+                <a:gd name="connsiteX1" fmla="*/ 157018 w 226400"/>
+                <a:gd name="connsiteY1" fmla="*/ 5211 h 171466"/>
+                <a:gd name="connsiteX2" fmla="*/ 221673 w 226400"/>
+                <a:gd name="connsiteY2" fmla="*/ 125284 h 171466"/>
+                <a:gd name="connsiteX3" fmla="*/ 36945 w 226400"/>
+                <a:gd name="connsiteY3" fmla="*/ 171466 h 171466"/>
+              </a:gdLst>
+              <a:ahLst/>
+              <a:cxnLst>
+                <a:cxn ang="0">
+                  <a:pos x="connsiteX0" y="connsiteY0"/>
+                </a:cxn>
+                <a:cxn ang="0">
+                  <a:pos x="connsiteX1" y="connsiteY1"/>
+                </a:cxn>
+                <a:cxn ang="0">
+                  <a:pos x="connsiteX2" y="connsiteY2"/>
+                </a:cxn>
+                <a:cxn ang="0">
+                  <a:pos x="connsiteX3" y="connsiteY3"/>
+                </a:cxn>
+              </a:cxnLst>
+              <a:rect l="l" t="t" r="r" b="b"/>
+              <a:pathLst>
+                <a:path w="226400" h="171466">
+                  <a:moveTo>
+                    <a:pt x="0" y="32920"/>
+                  </a:moveTo>
+                  <a:cubicBezTo>
+                    <a:pt x="60036" y="11368"/>
+                    <a:pt x="120073" y="-10183"/>
+                    <a:pt x="157018" y="5211"/>
+                  </a:cubicBezTo>
+                  <a:cubicBezTo>
+                    <a:pt x="193963" y="20605"/>
+                    <a:pt x="241685" y="97575"/>
+                    <a:pt x="221673" y="125284"/>
+                  </a:cubicBezTo>
+                  <a:cubicBezTo>
+                    <a:pt x="201661" y="152993"/>
+                    <a:pt x="119303" y="162229"/>
+                    <a:pt x="36945" y="171466"/>
+                  </a:cubicBezTo>
+                </a:path>
+              </a:pathLst>
+            </a:custGeom>
+            <a:ln w="19050">
+              <a:solidFill>
+                <a:srgbClr val="00B050"/>
+              </a:solidFill>
+              <a:headEnd type="arrow" w="med" len="med"/>
+              <a:tailEnd type="none" w="med" len="med"/>
+            </a:ln>
+          </p:spPr>
+          <p:style>
+            <a:lnRef idx="1">
+              <a:schemeClr val="accent1"/>
+            </a:lnRef>
+            <a:fillRef idx="0">
+              <a:schemeClr val="accent1"/>
+            </a:fillRef>
+            <a:effectRef idx="0">
+              <a:schemeClr val="accent1"/>
+            </a:effectRef>
+            <a:fontRef idx="minor">
+              <a:schemeClr val="tx1"/>
+            </a:fontRef>
+          </p:style>
+          <p:txBody>
+            <a:bodyPr rtlCol="0" anchor="ctr"/>
+            <a:lstStyle/>
+            <a:p>
+              <a:pPr algn="ctr"/>
+              <a:endParaRPr lang="en-SG"/>
+            </a:p>
+          </p:txBody>
+        </p:sp>
+        <p:sp>
+          <p:nvSpPr>
+            <p:cNvPr id="56" name="Rectangle 55"/>
+            <p:cNvSpPr/>
+            <p:nvPr/>
+          </p:nvSpPr>
+          <p:spPr>
+            <a:xfrm>
+              <a:off x="1147403" y="5712513"/>
+              <a:ext cx="98080" cy="169591"/>
+            </a:xfrm>
+            <a:prstGeom prst="rect">
+              <a:avLst/>
+            </a:prstGeom>
+            <a:solidFill>
+              <a:srgbClr val="00B050"/>
+            </a:solidFill>
+            <a:ln>
+              <a:solidFill>
+                <a:schemeClr val="bg1"/>
+              </a:solidFill>
+            </a:ln>
+            <a:effectLst/>
+          </p:spPr>
+          <p:style>
+            <a:lnRef idx="1">
+              <a:schemeClr val="accent3"/>
+            </a:lnRef>
+            <a:fillRef idx="2">
+              <a:schemeClr val="accent3"/>
+            </a:fillRef>
+            <a:effectRef idx="1">
+              <a:schemeClr val="accent3"/>
+            </a:effectRef>
+            <a:fontRef idx="minor">
+              <a:schemeClr val="dk1"/>
+            </a:fontRef>
+          </p:style>
+          <p:txBody>
+            <a:bodyPr rtlCol="0" anchor="ctr"/>
+            <a:lstStyle/>
+            <a:p>
+              <a:pPr algn="ctr"/>
+              <a:endParaRPr lang="en-SG" sz="1400">
+                <a:solidFill>
+                  <a:schemeClr val="dk1"/>
+                </a:solidFill>
+              </a:endParaRPr>
+            </a:p>
+          </p:txBody>
+        </p:sp>
+      </p:grpSp>
+      <p:sp>
+        <p:nvSpPr>
+          <p:cNvPr id="57" name="TextBox 56"/>
+          <p:cNvSpPr txBox="1"/>
+          <p:nvPr/>
+        </p:nvSpPr>
+        <p:spPr>
+          <a:xfrm>
+            <a:off x="194562" y="5444571"/>
+            <a:ext cx="794081" cy="430887"/>
+          </a:xfrm>
+          <a:prstGeom prst="rect">
+            <a:avLst/>
+          </a:prstGeom>
+          <a:noFill/>
+        </p:spPr>
+        <p:txBody>
+          <a:bodyPr wrap="square" lIns="0" tIns="0" rIns="0" bIns="0" rtlCol="0">
+            <a:spAutoFit/>
+          </a:bodyPr>
+          <a:lstStyle/>
+          <a:p>
+            <a:pPr algn="r"/>
+            <a:r>
+              <a:rPr lang="en-US" sz="1400" dirty="0">
+                <a:solidFill>
+                  <a:srgbClr val="00B050"/>
+                </a:solidFill>
+              </a:rPr>
+              <a:t>Update status bar</a:t>
+            </a:r>
+          </a:p>
+        </p:txBody>
+      </p:sp>
+      <p:grpSp>
+        <p:nvGrpSpPr>
+          <p:cNvPr id="58" name="Group 57"/>
+          <p:cNvGrpSpPr/>
+          <p:nvPr/>
+        </p:nvGrpSpPr>
+        <p:grpSpPr>
+          <a:xfrm flipH="1">
+            <a:off x="7936842" y="5335662"/>
+            <a:ext cx="217349" cy="270072"/>
+            <a:chOff x="1028134" y="5612032"/>
+            <a:chExt cx="217349" cy="270072"/>
+          </a:xfrm>
+        </p:grpSpPr>
+        <p:sp>
+          <p:nvSpPr>
+            <p:cNvPr id="59" name="Freeform 58"/>
+            <p:cNvSpPr/>
+            <p:nvPr/>
+          </p:nvSpPr>
+          <p:spPr>
+            <a:xfrm rot="2600998" flipH="1" flipV="1">
+              <a:off x="1028134" y="5612032"/>
+              <a:ext cx="167452" cy="116880"/>
+            </a:xfrm>
+            <a:custGeom>
+              <a:avLst/>
+              <a:gdLst>
+                <a:gd name="connsiteX0" fmla="*/ 0 w 226400"/>
+                <a:gd name="connsiteY0" fmla="*/ 32920 h 171466"/>
+                <a:gd name="connsiteX1" fmla="*/ 157018 w 226400"/>
+                <a:gd name="connsiteY1" fmla="*/ 5211 h 171466"/>
+                <a:gd name="connsiteX2" fmla="*/ 221673 w 226400"/>
+                <a:gd name="connsiteY2" fmla="*/ 125284 h 171466"/>
+                <a:gd name="connsiteX3" fmla="*/ 36945 w 226400"/>
+                <a:gd name="connsiteY3" fmla="*/ 171466 h 171466"/>
+              </a:gdLst>
+              <a:ahLst/>
+              <a:cxnLst>
+                <a:cxn ang="0">
+                  <a:pos x="connsiteX0" y="connsiteY0"/>
+                </a:cxn>
+                <a:cxn ang="0">
+                  <a:pos x="connsiteX1" y="connsiteY1"/>
+                </a:cxn>
+                <a:cxn ang="0">
+                  <a:pos x="connsiteX2" y="connsiteY2"/>
+                </a:cxn>
+                <a:cxn ang="0">
+                  <a:pos x="connsiteX3" y="connsiteY3"/>
+                </a:cxn>
+              </a:cxnLst>
+              <a:rect l="l" t="t" r="r" b="b"/>
+              <a:pathLst>
+                <a:path w="226400" h="171466">
+                  <a:moveTo>
+                    <a:pt x="0" y="32920"/>
+                  </a:moveTo>
+                  <a:cubicBezTo>
+                    <a:pt x="60036" y="11368"/>
+                    <a:pt x="120073" y="-10183"/>
+                    <a:pt x="157018" y="5211"/>
+                  </a:cubicBezTo>
+                  <a:cubicBezTo>
+                    <a:pt x="193963" y="20605"/>
+                    <a:pt x="241685" y="97575"/>
+                    <a:pt x="221673" y="125284"/>
+                  </a:cubicBezTo>
+                  <a:cubicBezTo>
+                    <a:pt x="201661" y="152993"/>
+                    <a:pt x="119303" y="162229"/>
+                    <a:pt x="36945" y="171466"/>
+                  </a:cubicBezTo>
+                </a:path>
+              </a:pathLst>
+            </a:custGeom>
+            <a:ln w="19050">
+              <a:solidFill>
+                <a:schemeClr val="accent6">
+                  <a:lumMod val="75000"/>
+                </a:schemeClr>
+              </a:solidFill>
+              <a:headEnd type="arrow" w="med" len="med"/>
+              <a:tailEnd type="none" w="med" len="med"/>
+            </a:ln>
+          </p:spPr>
+          <p:style>
+            <a:lnRef idx="1">
+              <a:schemeClr val="accent1"/>
+            </a:lnRef>
+            <a:fillRef idx="0">
+              <a:schemeClr val="accent1"/>
+            </a:fillRef>
+            <a:effectRef idx="0">
+              <a:schemeClr val="accent1"/>
+            </a:effectRef>
+            <a:fontRef idx="minor">
+              <a:schemeClr val="tx1"/>
+            </a:fontRef>
+          </p:style>
+          <p:txBody>
+            <a:bodyPr rtlCol="0" anchor="ctr"/>
+            <a:lstStyle/>
+            <a:p>
+              <a:pPr algn="ctr"/>
+              <a:endParaRPr lang="en-SG"/>
+            </a:p>
+          </p:txBody>
+        </p:sp>
+        <p:sp>
+          <p:nvSpPr>
+            <p:cNvPr id="60" name="Rectangle 59"/>
+            <p:cNvSpPr/>
+            <p:nvPr/>
+          </p:nvSpPr>
+          <p:spPr>
+            <a:xfrm>
+              <a:off x="1147403" y="5712513"/>
+              <a:ext cx="98080" cy="169591"/>
+            </a:xfrm>
+            <a:prstGeom prst="rect">
+              <a:avLst/>
+            </a:prstGeom>
+            <a:solidFill>
+              <a:schemeClr val="accent6">
+                <a:lumMod val="75000"/>
+              </a:schemeClr>
+            </a:solidFill>
+            <a:ln>
+              <a:solidFill>
+                <a:schemeClr val="bg1"/>
+              </a:solidFill>
+            </a:ln>
+            <a:effectLst/>
+          </p:spPr>
+          <p:style>
+            <a:lnRef idx="1">
+              <a:schemeClr val="accent3"/>
+            </a:lnRef>
+            <a:fillRef idx="2">
+              <a:schemeClr val="accent3"/>
+            </a:fillRef>
+            <a:effectRef idx="1">
+              <a:schemeClr val="accent3"/>
+            </a:effectRef>
+            <a:fontRef idx="minor">
+              <a:schemeClr val="dk1"/>
+            </a:fontRef>
+          </p:style>
+          <p:txBody>
+            <a:bodyPr rtlCol="0" anchor="ctr"/>
+            <a:lstStyle/>
+            <a:p>
+              <a:pPr algn="ctr"/>
+              <a:endParaRPr lang="en-SG" sz="1400">
+                <a:solidFill>
+                  <a:schemeClr val="dk1"/>
+                </a:solidFill>
+              </a:endParaRPr>
+            </a:p>
+          </p:txBody>
+        </p:sp>
+      </p:grpSp>
+      <p:sp>
+        <p:nvSpPr>
+          <p:cNvPr id="61" name="TextBox 60"/>
+          <p:cNvSpPr txBox="1"/>
+          <p:nvPr/>
+        </p:nvSpPr>
+        <p:spPr>
+          <a:xfrm>
+            <a:off x="8223953" y="5180992"/>
+            <a:ext cx="539047" cy="430887"/>
+          </a:xfrm>
+          <a:prstGeom prst="rect">
+            <a:avLst/>
+          </a:prstGeom>
+          <a:noFill/>
+        </p:spPr>
+        <p:txBody>
+          <a:bodyPr wrap="square" lIns="0" tIns="0" rIns="0" bIns="0" rtlCol="0">
+            <a:spAutoFit/>
+          </a:bodyPr>
+          <a:lstStyle/>
+          <a:p>
+            <a:r>
+              <a:rPr lang="en-US" sz="1400" dirty="0">
+                <a:solidFill>
+                  <a:schemeClr val="accent6">
+                    <a:lumMod val="75000"/>
+                  </a:schemeClr>
+                </a:solidFill>
+              </a:rPr>
+              <a:t>Save </a:t>
+            </a:r>
+            <a:br>
+              <a:rPr lang="en-US" sz="1400" dirty="0">
+                <a:solidFill>
+                  <a:schemeClr val="accent6">
+                    <a:lumMod val="75000"/>
+                  </a:schemeClr>
+                </a:solidFill>
+              </a:rPr>
+            </a:br>
+            <a:r>
+              <a:rPr lang="en-US" sz="1400" dirty="0">
+                <a:solidFill>
+                  <a:schemeClr val="accent6">
+                    <a:lumMod val="75000"/>
+                  </a:schemeClr>
+                </a:solidFill>
+              </a:rPr>
+              <a:t>to file</a:t>
+            </a:r>
+          </a:p>
+        </p:txBody>
+      </p:sp>
+    </p:spTree>
+    <p:extLst>
+      <p:ext uri="{BB962C8B-B14F-4D97-AF65-F5344CB8AC3E}">
+        <p14:creationId xmlns:p14="http://schemas.microsoft.com/office/powerpoint/2010/main" val="3089169443"/>
       </p:ext>
     </p:extLst>
   </p:cSld>

</xml_diff>